<commit_message>
Added homework for module 1 and module 4, updated various slides.
</commit_message>
<xml_diff>
--- a/University of Washington Class/Module 4 - Voltage control devices.pptx
+++ b/University of Washington Class/Module 4 - Voltage control devices.pptx
@@ -262,7 +262,7 @@
             <a:fld id="{30456DE2-1550-4DE2-8C7A-8D9992B45402}" type="datetimeFigureOut">
               <a:rPr lang="en-US" smtClean="0"/>
               <a:pPr/>
-              <a:t>11/17/2011</a:t>
+              <a:t>11/21/2011</a:t>
             </a:fld>
             <a:endParaRPr lang="en-US"/>
           </a:p>
@@ -714,7 +714,7 @@
           <a:p>
             <a:fld id="{F5373481-B42A-4D4F-86EA-A88290C58964}" type="datetime1">
               <a:rPr lang="en-US" smtClean="0"/>
-              <a:t>11/17/2011</a:t>
+              <a:t>11/21/2011</a:t>
             </a:fld>
             <a:endParaRPr lang="en-US"/>
           </a:p>
@@ -983,7 +983,7 @@
           <a:p>
             <a:fld id="{03F670FF-8926-4709-96F6-FC2958129ED2}" type="datetime1">
               <a:rPr lang="en-US" smtClean="0"/>
-              <a:t>11/17/2011</a:t>
+              <a:t>11/21/2011</a:t>
             </a:fld>
             <a:endParaRPr lang="en-US"/>
           </a:p>
@@ -1159,7 +1159,7 @@
           <a:p>
             <a:fld id="{1BF16CE4-EFFC-4BDF-B5A4-4A15C47E021B}" type="datetime1">
               <a:rPr lang="en-US" smtClean="0"/>
-              <a:t>11/17/2011</a:t>
+              <a:t>11/21/2011</a:t>
             </a:fld>
             <a:endParaRPr lang="en-US"/>
           </a:p>
@@ -1349,7 +1349,7 @@
           <a:p>
             <a:fld id="{D89124DC-29B6-4231-9D25-0C78D5EFDDC9}" type="datetime1">
               <a:rPr lang="en-US" smtClean="0"/>
-              <a:t>11/17/2011</a:t>
+              <a:t>11/21/2011</a:t>
             </a:fld>
             <a:endParaRPr lang="en-US" dirty="0"/>
           </a:p>
@@ -1598,7 +1598,7 @@
           <a:p>
             <a:fld id="{63DA24F3-3618-4EAF-A9E8-EEFE221E1493}" type="datetime1">
               <a:rPr lang="en-US" smtClean="0"/>
-              <a:t>11/17/2011</a:t>
+              <a:t>11/21/2011</a:t>
             </a:fld>
             <a:endParaRPr lang="en-US"/>
           </a:p>
@@ -1882,7 +1882,7 @@
           <a:p>
             <a:fld id="{69D8CDEA-265C-4EA9-A607-0D7D771780DB}" type="datetime1">
               <a:rPr lang="en-US" smtClean="0"/>
-              <a:t>11/17/2011</a:t>
+              <a:t>11/21/2011</a:t>
             </a:fld>
             <a:endParaRPr lang="en-US"/>
           </a:p>
@@ -2300,7 +2300,7 @@
           <a:p>
             <a:fld id="{ACFA6542-36F3-4A89-93B6-B9FED0856CDB}" type="datetime1">
               <a:rPr lang="en-US" smtClean="0"/>
-              <a:t>11/17/2011</a:t>
+              <a:t>11/21/2011</a:t>
             </a:fld>
             <a:endParaRPr lang="en-US"/>
           </a:p>
@@ -2414,7 +2414,7 @@
           <a:p>
             <a:fld id="{AE3B9829-009A-44FD-B649-E323418E7E5E}" type="datetime1">
               <a:rPr lang="en-US" smtClean="0"/>
-              <a:t>11/17/2011</a:t>
+              <a:t>11/21/2011</a:t>
             </a:fld>
             <a:endParaRPr lang="en-US"/>
           </a:p>
@@ -2505,7 +2505,7 @@
           <a:p>
             <a:fld id="{4391B5C5-7D92-4C37-8071-F3311CBE73D5}" type="datetime1">
               <a:rPr lang="en-US" smtClean="0"/>
-              <a:t>11/17/2011</a:t>
+              <a:t>11/21/2011</a:t>
             </a:fld>
             <a:endParaRPr lang="en-US"/>
           </a:p>
@@ -2778,7 +2778,7 @@
           <a:p>
             <a:fld id="{4689F7FE-6C86-4059-B972-0BBDA5F301D9}" type="datetime1">
               <a:rPr lang="en-US" smtClean="0"/>
-              <a:t>11/17/2011</a:t>
+              <a:t>11/21/2011</a:t>
             </a:fld>
             <a:endParaRPr lang="en-US"/>
           </a:p>
@@ -3027,7 +3027,7 @@
           <a:p>
             <a:fld id="{F09338A6-2CCC-46F1-9871-B278557BB635}" type="datetime1">
               <a:rPr lang="en-US" smtClean="0"/>
-              <a:t>11/17/2011</a:t>
+              <a:t>11/21/2011</a:t>
             </a:fld>
             <a:endParaRPr lang="en-US"/>
           </a:p>
@@ -3240,7 +3240,7 @@
           <a:p>
             <a:fld id="{14FE97D8-1050-4CA4-8B4F-E964B5B645D9}" type="datetime1">
               <a:rPr lang="en-US" smtClean="0"/>
-              <a:t>11/17/2011</a:t>
+              <a:t>11/21/2011</a:t>
             </a:fld>
             <a:endParaRPr lang="en-US" dirty="0"/>
           </a:p>
@@ -4815,7 +4815,7 @@
           <a:graphicData uri="http://schemas.openxmlformats.org/presentationml/2006/ole">
             <mc:AlternateContent xmlns:mc="http://schemas.openxmlformats.org/markup-compatibility/2006">
               <mc:Choice xmlns:v="urn:schemas-microsoft-com:vml" Requires="v">
-                <p:oleObj spid="_x0000_s20635" name="Equation" r:id="rId7" imgW="1739880" imgH="228600" progId="Equation.3">
+                <p:oleObj spid="_x0000_s20638" name="Equation" r:id="rId7" imgW="1739880" imgH="228600" progId="Equation.3">
                   <p:embed/>
                 </p:oleObj>
               </mc:Choice>
@@ -4879,7 +4879,7 @@
           <a:graphicData uri="http://schemas.openxmlformats.org/presentationml/2006/ole">
             <mc:AlternateContent xmlns:mc="http://schemas.openxmlformats.org/markup-compatibility/2006">
               <mc:Choice xmlns:v="urn:schemas-microsoft-com:vml" Requires="v">
-                <p:oleObj spid="_x0000_s20636" name="Equation" r:id="rId9" imgW="2108160" imgH="228600" progId="Equation.3">
+                <p:oleObj spid="_x0000_s20639" name="Equation" r:id="rId9" imgW="2108160" imgH="228600" progId="Equation.3">
                   <p:embed/>
                 </p:oleObj>
               </mc:Choice>
@@ -4943,7 +4943,7 @@
           <a:graphicData uri="http://schemas.openxmlformats.org/presentationml/2006/ole">
             <mc:AlternateContent xmlns:mc="http://schemas.openxmlformats.org/markup-compatibility/2006">
               <mc:Choice xmlns:v="urn:schemas-microsoft-com:vml" Requires="v">
-                <p:oleObj spid="_x0000_s20637" name="Equation" r:id="rId11" imgW="1981080" imgH="253800" progId="Equation.3">
+                <p:oleObj spid="_x0000_s20640" name="Equation" r:id="rId11" imgW="1981080" imgH="253800" progId="Equation.3">
                   <p:embed/>
                 </p:oleObj>
               </mc:Choice>
@@ -5994,7 +5994,7 @@
           <a:graphicData uri="http://schemas.openxmlformats.org/presentationml/2006/ole">
             <mc:AlternateContent xmlns:mc="http://schemas.openxmlformats.org/markup-compatibility/2006">
               <mc:Choice xmlns:v="urn:schemas-microsoft-com:vml" Requires="v">
-                <p:oleObj spid="_x0000_s24626" name="Equation" r:id="rId3" imgW="850680" imgH="431640" progId="Equation.3">
+                <p:oleObj spid="_x0000_s24627" name="Equation" r:id="rId3" imgW="850680" imgH="431640" progId="Equation.3">
                   <p:embed/>
                 </p:oleObj>
               </mc:Choice>
@@ -6320,7 +6320,7 @@
           <a:graphicData uri="http://schemas.openxmlformats.org/presentationml/2006/ole">
             <mc:AlternateContent xmlns:mc="http://schemas.openxmlformats.org/markup-compatibility/2006">
               <mc:Choice xmlns:v="urn:schemas-microsoft-com:vml" Requires="v">
-                <p:oleObj spid="_x0000_s25685" name="Equation" r:id="rId3" imgW="850680" imgH="431640" progId="Equation.3">
+                <p:oleObj spid="_x0000_s25687" name="Equation" r:id="rId3" imgW="850680" imgH="431640" progId="Equation.3">
                   <p:embed/>
                 </p:oleObj>
               </mc:Choice>
@@ -6409,7 +6409,7 @@
           <a:graphicData uri="http://schemas.openxmlformats.org/presentationml/2006/ole">
             <mc:AlternateContent xmlns:mc="http://schemas.openxmlformats.org/markup-compatibility/2006">
               <mc:Choice xmlns:v="urn:schemas-microsoft-com:vml" Requires="v">
-                <p:oleObj spid="_x0000_s25686" name="Equation" r:id="rId5" imgW="850680" imgH="431640" progId="Equation.3">
+                <p:oleObj spid="_x0000_s25688" name="Equation" r:id="rId5" imgW="850680" imgH="431640" progId="Equation.3">
                   <p:embed/>
                 </p:oleObj>
               </mc:Choice>
@@ -7048,7 +7048,7 @@
           <a:graphicData uri="http://schemas.openxmlformats.org/presentationml/2006/ole">
             <mc:AlternateContent xmlns:mc="http://schemas.openxmlformats.org/markup-compatibility/2006">
               <mc:Choice xmlns:v="urn:schemas-microsoft-com:vml" Requires="v">
-                <p:oleObj spid="_x0000_s21631" name="Equation" r:id="rId3" imgW="850680" imgH="431640" progId="Equation.3">
+                <p:oleObj spid="_x0000_s21633" name="Equation" r:id="rId3" imgW="850680" imgH="431640" progId="Equation.3">
                   <p:embed/>
                 </p:oleObj>
               </mc:Choice>
@@ -7112,7 +7112,7 @@
           <a:graphicData uri="http://schemas.openxmlformats.org/presentationml/2006/ole">
             <mc:AlternateContent xmlns:mc="http://schemas.openxmlformats.org/markup-compatibility/2006">
               <mc:Choice xmlns:v="urn:schemas-microsoft-com:vml" Requires="v">
-                <p:oleObj spid="_x0000_s21632" name="Equation" r:id="rId5" imgW="1193760" imgH="431640" progId="Equation.3">
+                <p:oleObj spid="_x0000_s21634" name="Equation" r:id="rId5" imgW="1193760" imgH="431640" progId="Equation.3">
                   <p:embed/>
                 </p:oleObj>
               </mc:Choice>
@@ -11181,7 +11181,7 @@
           <a:graphicData uri="http://schemas.openxmlformats.org/presentationml/2006/ole">
             <mc:AlternateContent xmlns:mc="http://schemas.openxmlformats.org/markup-compatibility/2006">
               <mc:Choice xmlns:v="urn:schemas-microsoft-com:vml" Requires="v">
-                <p:oleObj spid="_x0000_s2314" name="Equation" r:id="rId3" imgW="4203360" imgH="558720" progId="Equation.3">
+                <p:oleObj spid="_x0000_s2317" name="Equation" r:id="rId3" imgW="4203360" imgH="558720" progId="Equation.3">
                   <p:embed/>
                 </p:oleObj>
               </mc:Choice>
@@ -11249,7 +11249,7 @@
           <a:graphicData uri="http://schemas.openxmlformats.org/presentationml/2006/ole">
             <mc:AlternateContent xmlns:mc="http://schemas.openxmlformats.org/markup-compatibility/2006">
               <mc:Choice xmlns:v="urn:schemas-microsoft-com:vml" Requires="v">
-                <p:oleObj spid="_x0000_s2315" name="Equation" r:id="rId5" imgW="4165560" imgH="558720" progId="Equation.3">
+                <p:oleObj spid="_x0000_s2318" name="Equation" r:id="rId5" imgW="4165560" imgH="558720" progId="Equation.3">
                   <p:embed/>
                 </p:oleObj>
               </mc:Choice>
@@ -11317,7 +11317,7 @@
           <a:graphicData uri="http://schemas.openxmlformats.org/presentationml/2006/ole">
             <mc:AlternateContent xmlns:mc="http://schemas.openxmlformats.org/markup-compatibility/2006">
               <mc:Choice xmlns:v="urn:schemas-microsoft-com:vml" Requires="v">
-                <p:oleObj spid="_x0000_s2316" name="Equation" r:id="rId7" imgW="1015920" imgH="228600" progId="Equation.3">
+                <p:oleObj spid="_x0000_s2319" name="Equation" r:id="rId7" imgW="1015920" imgH="228600" progId="Equation.3">
                   <p:embed/>
                 </p:oleObj>
               </mc:Choice>
@@ -12478,7 +12478,7 @@
           <a:graphicData uri="http://schemas.openxmlformats.org/presentationml/2006/ole">
             <mc:AlternateContent xmlns:mc="http://schemas.openxmlformats.org/markup-compatibility/2006">
               <mc:Choice xmlns:v="urn:schemas-microsoft-com:vml" Requires="v">
-                <p:oleObj spid="_x0000_s16523" name="Equation" r:id="rId3" imgW="4965480" imgH="558720" progId="Equation.3">
+                <p:oleObj spid="_x0000_s16525" name="Equation" r:id="rId3" imgW="4965480" imgH="558720" progId="Equation.3">
                   <p:embed/>
                 </p:oleObj>
               </mc:Choice>
@@ -12548,7 +12548,7 @@
           <a:graphicData uri="http://schemas.openxmlformats.org/presentationml/2006/ole">
             <mc:AlternateContent xmlns:mc="http://schemas.openxmlformats.org/markup-compatibility/2006">
               <mc:Choice xmlns:v="urn:schemas-microsoft-com:vml" Requires="v">
-                <p:oleObj spid="_x0000_s16524" name="Equation" r:id="rId5" imgW="4927320" imgH="558720" progId="Equation.3">
+                <p:oleObj spid="_x0000_s16526" name="Equation" r:id="rId5" imgW="4927320" imgH="558720" progId="Equation.3">
                   <p:embed/>
                 </p:oleObj>
               </mc:Choice>
@@ -14784,7 +14784,7 @@
           <a:graphicData uri="http://schemas.openxmlformats.org/presentationml/2006/ole">
             <mc:AlternateContent xmlns:mc="http://schemas.openxmlformats.org/markup-compatibility/2006">
               <mc:Choice xmlns:v="urn:schemas-microsoft-com:vml" Requires="v">
-                <p:oleObj spid="_x0000_s27686" name="Equation" r:id="rId3" imgW="114120" imgH="215640" progId="Equation.3">
+                <p:oleObj spid="_x0000_s27687" name="Equation" r:id="rId3" imgW="114120" imgH="215640" progId="Equation.3">
                   <p:embed/>
                 </p:oleObj>
               </mc:Choice>
@@ -14944,7 +14944,7 @@
           <a:graphicData uri="http://schemas.openxmlformats.org/presentationml/2006/ole">
             <mc:AlternateContent xmlns:mc="http://schemas.openxmlformats.org/markup-compatibility/2006">
               <mc:Choice xmlns:v="urn:schemas-microsoft-com:vml" Requires="v">
-                <p:oleObj spid="_x0000_s10880" name="Equation" r:id="rId3" imgW="114120" imgH="215640" progId="Equation.3">
+                <p:oleObj spid="_x0000_s10888" name="Equation" r:id="rId3" imgW="114120" imgH="215640" progId="Equation.3">
                   <p:embed/>
                 </p:oleObj>
               </mc:Choice>
@@ -15014,7 +15014,7 @@
           <a:graphicData uri="http://schemas.openxmlformats.org/presentationml/2006/ole">
             <mc:AlternateContent xmlns:mc="http://schemas.openxmlformats.org/markup-compatibility/2006">
               <mc:Choice xmlns:v="urn:schemas-microsoft-com:vml" Requires="v">
-                <p:oleObj spid="_x0000_s10881" name="Equation" r:id="rId5" imgW="4076640" imgH="558720" progId="Equation.3">
+                <p:oleObj spid="_x0000_s10889" name="Equation" r:id="rId5" imgW="4076640" imgH="558720" progId="Equation.3">
                   <p:embed/>
                 </p:oleObj>
               </mc:Choice>
@@ -15084,7 +15084,7 @@
           <a:graphicData uri="http://schemas.openxmlformats.org/presentationml/2006/ole">
             <mc:AlternateContent xmlns:mc="http://schemas.openxmlformats.org/markup-compatibility/2006">
               <mc:Choice xmlns:v="urn:schemas-microsoft-com:vml" Requires="v">
-                <p:oleObj spid="_x0000_s10882" name="Equation" r:id="rId7" imgW="4038480" imgH="558720" progId="Equation.3">
+                <p:oleObj spid="_x0000_s10890" name="Equation" r:id="rId7" imgW="4038480" imgH="558720" progId="Equation.3">
                   <p:embed/>
                 </p:oleObj>
               </mc:Choice>
@@ -15160,7 +15160,7 @@
           <a:graphicData uri="http://schemas.openxmlformats.org/presentationml/2006/ole">
             <mc:AlternateContent xmlns:mc="http://schemas.openxmlformats.org/markup-compatibility/2006">
               <mc:Choice xmlns:v="urn:schemas-microsoft-com:vml" Requires="v">
-                <p:oleObj spid="_x0000_s10883" name="Equation" r:id="rId9" imgW="1777680" imgH="241200" progId="Equation.3">
+                <p:oleObj spid="_x0000_s10891" name="Equation" r:id="rId9" imgW="1777680" imgH="241200" progId="Equation.3">
                   <p:embed/>
                 </p:oleObj>
               </mc:Choice>
@@ -15230,7 +15230,7 @@
           <a:graphicData uri="http://schemas.openxmlformats.org/presentationml/2006/ole">
             <mc:AlternateContent xmlns:mc="http://schemas.openxmlformats.org/markup-compatibility/2006">
               <mc:Choice xmlns:v="urn:schemas-microsoft-com:vml" Requires="v">
-                <p:oleObj spid="_x0000_s10884" name="Equation" r:id="rId11" imgW="977760" imgH="228600" progId="Equation.3">
+                <p:oleObj spid="_x0000_s10892" name="Equation" r:id="rId11" imgW="977760" imgH="228600" progId="Equation.3">
                   <p:embed/>
                 </p:oleObj>
               </mc:Choice>
@@ -15300,7 +15300,7 @@
           <a:graphicData uri="http://schemas.openxmlformats.org/presentationml/2006/ole">
             <mc:AlternateContent xmlns:mc="http://schemas.openxmlformats.org/markup-compatibility/2006">
               <mc:Choice xmlns:v="urn:schemas-microsoft-com:vml" Requires="v">
-                <p:oleObj spid="_x0000_s10885" name="Equation" r:id="rId13" imgW="1536480" imgH="482400" progId="Equation.3">
+                <p:oleObj spid="_x0000_s10893" name="Equation" r:id="rId13" imgW="1536480" imgH="482400" progId="Equation.3">
                   <p:embed/>
                 </p:oleObj>
               </mc:Choice>
@@ -15370,7 +15370,7 @@
           <a:graphicData uri="http://schemas.openxmlformats.org/presentationml/2006/ole">
             <mc:AlternateContent xmlns:mc="http://schemas.openxmlformats.org/markup-compatibility/2006">
               <mc:Choice xmlns:v="urn:schemas-microsoft-com:vml" Requires="v">
-                <p:oleObj spid="_x0000_s10886" name="Equation" r:id="rId15" imgW="2145960" imgH="431640" progId="Equation.3">
+                <p:oleObj spid="_x0000_s10894" name="Equation" r:id="rId15" imgW="2145960" imgH="431640" progId="Equation.3">
                   <p:embed/>
                 </p:oleObj>
               </mc:Choice>
@@ -15440,7 +15440,7 @@
           <a:graphicData uri="http://schemas.openxmlformats.org/presentationml/2006/ole">
             <mc:AlternateContent xmlns:mc="http://schemas.openxmlformats.org/markup-compatibility/2006">
               <mc:Choice xmlns:v="urn:schemas-microsoft-com:vml" Requires="v">
-                <p:oleObj spid="_x0000_s10887" name="Equation" r:id="rId17" imgW="1612800" imgH="228600" progId="Equation.3">
+                <p:oleObj spid="_x0000_s10895" name="Equation" r:id="rId17" imgW="1612800" imgH="228600" progId="Equation.3">
                   <p:embed/>
                 </p:oleObj>
               </mc:Choice>
@@ -16334,7 +16334,7 @@
           <a:graphicData uri="http://schemas.openxmlformats.org/presentationml/2006/ole">
             <mc:AlternateContent xmlns:mc="http://schemas.openxmlformats.org/markup-compatibility/2006">
               <mc:Choice xmlns:v="urn:schemas-microsoft-com:vml" Requires="v">
-                <p:oleObj spid="_x0000_s28830" name="Equation" r:id="rId3" imgW="114120" imgH="215640" progId="Equation.3">
+                <p:oleObj spid="_x0000_s28834" name="Equation" r:id="rId3" imgW="114120" imgH="215640" progId="Equation.3">
                   <p:embed/>
                 </p:oleObj>
               </mc:Choice>
@@ -16410,7 +16410,7 @@
           <a:graphicData uri="http://schemas.openxmlformats.org/presentationml/2006/ole">
             <mc:AlternateContent xmlns:mc="http://schemas.openxmlformats.org/markup-compatibility/2006">
               <mc:Choice xmlns:v="urn:schemas-microsoft-com:vml" Requires="v">
-                <p:oleObj spid="_x0000_s28831" name="Equation" r:id="rId5" imgW="10756800" imgH="1143000" progId="Equation.3">
+                <p:oleObj spid="_x0000_s28835" name="Equation" r:id="rId5" imgW="10756800" imgH="1143000" progId="Equation.3">
                   <p:embed/>
                 </p:oleObj>
               </mc:Choice>
@@ -16472,7 +16472,7 @@
           <a:graphicData uri="http://schemas.openxmlformats.org/presentationml/2006/ole">
             <mc:AlternateContent xmlns:mc="http://schemas.openxmlformats.org/markup-compatibility/2006">
               <mc:Choice xmlns:v="urn:schemas-microsoft-com:vml" Requires="v">
-                <p:oleObj spid="_x0000_s28832" name="Equation" r:id="rId7" imgW="2145960" imgH="431640" progId="Equation.3">
+                <p:oleObj spid="_x0000_s28836" name="Equation" r:id="rId7" imgW="2145960" imgH="431640" progId="Equation.3">
                   <p:embed/>
                 </p:oleObj>
               </mc:Choice>
@@ -16561,7 +16561,7 @@
           <a:graphicData uri="http://schemas.openxmlformats.org/presentationml/2006/ole">
             <mc:AlternateContent xmlns:mc="http://schemas.openxmlformats.org/markup-compatibility/2006">
               <mc:Choice xmlns:v="urn:schemas-microsoft-com:vml" Requires="v">
-                <p:oleObj spid="_x0000_s28833" name="Equation" r:id="rId9" imgW="10553400" imgH="1143000" progId="Equation.3">
+                <p:oleObj spid="_x0000_s28837" name="Equation" r:id="rId9" imgW="10553400" imgH="1143000" progId="Equation.3">
                   <p:embed/>
                 </p:oleObj>
               </mc:Choice>
@@ -17076,7 +17076,7 @@
           <a:graphicData uri="http://schemas.openxmlformats.org/presentationml/2006/ole">
             <mc:AlternateContent xmlns:mc="http://schemas.openxmlformats.org/markup-compatibility/2006">
               <mc:Choice xmlns:v="urn:schemas-microsoft-com:vml" Requires="v">
-                <p:oleObj spid="_x0000_s11810" name="Equation" r:id="rId3" imgW="114120" imgH="215640" progId="Equation.3">
+                <p:oleObj spid="_x0000_s11817" name="Equation" r:id="rId3" imgW="114120" imgH="215640" progId="Equation.3">
                   <p:embed/>
                 </p:oleObj>
               </mc:Choice>
@@ -17146,7 +17146,7 @@
           <a:graphicData uri="http://schemas.openxmlformats.org/presentationml/2006/ole">
             <mc:AlternateContent xmlns:mc="http://schemas.openxmlformats.org/markup-compatibility/2006">
               <mc:Choice xmlns:v="urn:schemas-microsoft-com:vml" Requires="v">
-                <p:oleObj spid="_x0000_s11811" name="Equation" r:id="rId5" imgW="1803240" imgH="482400" progId="Equation.3">
+                <p:oleObj spid="_x0000_s11818" name="Equation" r:id="rId5" imgW="1803240" imgH="482400" progId="Equation.3">
                   <p:embed/>
                 </p:oleObj>
               </mc:Choice>
@@ -17216,7 +17216,7 @@
           <a:graphicData uri="http://schemas.openxmlformats.org/presentationml/2006/ole">
             <mc:AlternateContent xmlns:mc="http://schemas.openxmlformats.org/markup-compatibility/2006">
               <mc:Choice xmlns:v="urn:schemas-microsoft-com:vml" Requires="v">
-                <p:oleObj spid="_x0000_s11812" name="Equation" r:id="rId7" imgW="1790640" imgH="266400" progId="Equation.3">
+                <p:oleObj spid="_x0000_s11819" name="Equation" r:id="rId7" imgW="1790640" imgH="266400" progId="Equation.3">
                   <p:embed/>
                 </p:oleObj>
               </mc:Choice>
@@ -17292,7 +17292,7 @@
           <a:graphicData uri="http://schemas.openxmlformats.org/presentationml/2006/ole">
             <mc:AlternateContent xmlns:mc="http://schemas.openxmlformats.org/markup-compatibility/2006">
               <mc:Choice xmlns:v="urn:schemas-microsoft-com:vml" Requires="v">
-                <p:oleObj spid="_x0000_s11813" name="Equation" r:id="rId9" imgW="2145960" imgH="431640" progId="Equation.3">
+                <p:oleObj spid="_x0000_s11820" name="Equation" r:id="rId9" imgW="2145960" imgH="431640" progId="Equation.3">
                   <p:embed/>
                 </p:oleObj>
               </mc:Choice>
@@ -17356,7 +17356,7 @@
           <a:graphicData uri="http://schemas.openxmlformats.org/presentationml/2006/ole">
             <mc:AlternateContent xmlns:mc="http://schemas.openxmlformats.org/markup-compatibility/2006">
               <mc:Choice xmlns:v="urn:schemas-microsoft-com:vml" Requires="v">
-                <p:oleObj spid="_x0000_s11814" name="Equation" r:id="rId11" imgW="2450880" imgH="228600" progId="Equation.3">
+                <p:oleObj spid="_x0000_s11821" name="Equation" r:id="rId11" imgW="2450880" imgH="228600" progId="Equation.3">
                   <p:embed/>
                 </p:oleObj>
               </mc:Choice>
@@ -17426,7 +17426,7 @@
           <a:graphicData uri="http://schemas.openxmlformats.org/presentationml/2006/ole">
             <mc:AlternateContent xmlns:mc="http://schemas.openxmlformats.org/markup-compatibility/2006">
               <mc:Choice xmlns:v="urn:schemas-microsoft-com:vml" Requires="v">
-                <p:oleObj spid="_x0000_s11815" name="Equation" r:id="rId13" imgW="634680" imgH="215640" progId="Equation.3">
+                <p:oleObj spid="_x0000_s11822" name="Equation" r:id="rId13" imgW="634680" imgH="215640" progId="Equation.3">
                   <p:embed/>
                 </p:oleObj>
               </mc:Choice>
@@ -17556,7 +17556,7 @@
           <a:graphicData uri="http://schemas.openxmlformats.org/presentationml/2006/ole">
             <mc:AlternateContent xmlns:mc="http://schemas.openxmlformats.org/markup-compatibility/2006">
               <mc:Choice xmlns:v="urn:schemas-microsoft-com:vml" Requires="v">
-                <p:oleObj spid="_x0000_s11816" name="Equation" r:id="rId15" imgW="1333440" imgH="1218960" progId="Equation.3">
+                <p:oleObj spid="_x0000_s11823" name="Equation" r:id="rId15" imgW="1333440" imgH="1218960" progId="Equation.3">
                   <p:embed/>
                 </p:oleObj>
               </mc:Choice>
@@ -18291,7 +18291,7 @@
           <a:graphicData uri="http://schemas.openxmlformats.org/presentationml/2006/ole">
             <mc:AlternateContent xmlns:mc="http://schemas.openxmlformats.org/markup-compatibility/2006">
               <mc:Choice xmlns:v="urn:schemas-microsoft-com:vml" Requires="v">
-                <p:oleObj spid="_x0000_s12535" name="Equation" r:id="rId3" imgW="114120" imgH="215640" progId="Equation.3">
+                <p:oleObj spid="_x0000_s12537" name="Equation" r:id="rId3" imgW="114120" imgH="215640" progId="Equation.3">
                   <p:embed/>
                 </p:oleObj>
               </mc:Choice>
@@ -18367,7 +18367,7 @@
           <a:graphicData uri="http://schemas.openxmlformats.org/presentationml/2006/ole">
             <mc:AlternateContent xmlns:mc="http://schemas.openxmlformats.org/markup-compatibility/2006">
               <mc:Choice xmlns:v="urn:schemas-microsoft-com:vml" Requires="v">
-                <p:oleObj spid="_x0000_s12536" name="Equation" r:id="rId5" imgW="1015920" imgH="1612800" progId="Equation.3">
+                <p:oleObj spid="_x0000_s12538" name="Equation" r:id="rId5" imgW="1015920" imgH="1612800" progId="Equation.3">
                   <p:embed/>
                 </p:oleObj>
               </mc:Choice>
@@ -18836,7 +18836,7 @@
           <a:graphicData uri="http://schemas.openxmlformats.org/presentationml/2006/ole">
             <mc:AlternateContent xmlns:mc="http://schemas.openxmlformats.org/markup-compatibility/2006">
               <mc:Choice xmlns:v="urn:schemas-microsoft-com:vml" Requires="v">
-                <p:oleObj spid="_x0000_s30760" name="Equation" r:id="rId3" imgW="5333760" imgH="558720" progId="Equation.3">
+                <p:oleObj spid="_x0000_s30762" name="Equation" r:id="rId3" imgW="5333760" imgH="558720" progId="Equation.3">
                   <p:embed/>
                 </p:oleObj>
               </mc:Choice>
@@ -18900,7 +18900,7 @@
           <a:graphicData uri="http://schemas.openxmlformats.org/presentationml/2006/ole">
             <mc:AlternateContent xmlns:mc="http://schemas.openxmlformats.org/markup-compatibility/2006">
               <mc:Choice xmlns:v="urn:schemas-microsoft-com:vml" Requires="v">
-                <p:oleObj spid="_x0000_s30761" name="Equation" r:id="rId5" imgW="5295600" imgH="558720" progId="Equation.3">
+                <p:oleObj spid="_x0000_s30763" name="Equation" r:id="rId5" imgW="5295600" imgH="558720" progId="Equation.3">
                   <p:embed/>
                 </p:oleObj>
               </mc:Choice>
@@ -19589,7 +19589,7 @@
           <a:graphicData uri="http://schemas.openxmlformats.org/presentationml/2006/ole">
             <mc:AlternateContent xmlns:mc="http://schemas.openxmlformats.org/markup-compatibility/2006">
               <mc:Choice xmlns:v="urn:schemas-microsoft-com:vml" Requires="v">
-                <p:oleObj spid="_x0000_s29732" name="Equation" r:id="rId3" imgW="1942920" imgH="761760" progId="Equation.3">
+                <p:oleObj spid="_x0000_s29733" name="Equation" r:id="rId3" imgW="1942920" imgH="761760" progId="Equation.3">
                   <p:embed/>
                 </p:oleObj>
               </mc:Choice>
@@ -20846,7 +20846,7 @@
           <a:graphicData uri="http://schemas.openxmlformats.org/presentationml/2006/ole">
             <mc:AlternateContent xmlns:mc="http://schemas.openxmlformats.org/markup-compatibility/2006">
               <mc:Choice xmlns:v="urn:schemas-microsoft-com:vml" Requires="v">
-                <p:oleObj spid="_x0000_s3226" name="Equation" r:id="rId4" imgW="3759120" imgH="431640" progId="Equation.3">
+                <p:oleObj spid="_x0000_s3228" name="Equation" r:id="rId4" imgW="3759120" imgH="431640" progId="Equation.3">
                   <p:embed/>
                 </p:oleObj>
               </mc:Choice>
@@ -20914,7 +20914,7 @@
           <a:graphicData uri="http://schemas.openxmlformats.org/presentationml/2006/ole">
             <mc:AlternateContent xmlns:mc="http://schemas.openxmlformats.org/markup-compatibility/2006">
               <mc:Choice xmlns:v="urn:schemas-microsoft-com:vml" Requires="v">
-                <p:oleObj spid="_x0000_s3227" name="Equation" r:id="rId6" imgW="2489040" imgH="431640" progId="Equation.3">
+                <p:oleObj spid="_x0000_s3229" name="Equation" r:id="rId6" imgW="2489040" imgH="431640" progId="Equation.3">
                   <p:embed/>
                 </p:oleObj>
               </mc:Choice>
@@ -21600,7 +21600,7 @@
           <a:graphicData uri="http://schemas.openxmlformats.org/presentationml/2006/ole">
             <mc:AlternateContent xmlns:mc="http://schemas.openxmlformats.org/markup-compatibility/2006">
               <mc:Choice xmlns:v="urn:schemas-microsoft-com:vml" Requires="v">
-                <p:oleObj spid="_x0000_s4177" r:id="rId3" imgW="3235112" imgH="3234987" progId="Msxml2.SAXXMLReader.5.0">
+                <p:oleObj spid="_x0000_s4178" r:id="rId3" imgW="3235112" imgH="3234987" progId="Msxml2.SAXXMLReader.5.0">
                   <p:embed/>
                 </p:oleObj>
               </mc:Choice>
@@ -23123,7 +23123,7 @@
           <a:graphicData uri="http://schemas.openxmlformats.org/presentationml/2006/ole">
             <mc:AlternateContent xmlns:mc="http://schemas.openxmlformats.org/markup-compatibility/2006">
               <mc:Choice xmlns:v="urn:schemas-microsoft-com:vml" Requires="v">
-                <p:oleObj spid="_x0000_s33831" name="Equation" r:id="rId5" imgW="3073320" imgH="1447560" progId="Equation.3">
+                <p:oleObj spid="_x0000_s33833" name="Equation" r:id="rId5" imgW="3073320" imgH="1447560" progId="Equation.3">
                   <p:embed/>
                 </p:oleObj>
               </mc:Choice>
@@ -23206,7 +23206,7 @@
           <a:graphicData uri="http://schemas.openxmlformats.org/presentationml/2006/ole">
             <mc:AlternateContent xmlns:mc="http://schemas.openxmlformats.org/markup-compatibility/2006">
               <mc:Choice xmlns:v="urn:schemas-microsoft-com:vml" Requires="v">
-                <p:oleObj spid="_x0000_s33832" name="Equation" r:id="rId7" imgW="3073320" imgH="1447560" progId="Equation.3">
+                <p:oleObj spid="_x0000_s33834" name="Equation" r:id="rId7" imgW="3073320" imgH="1447560" progId="Equation.3">
                   <p:embed/>
                 </p:oleObj>
               </mc:Choice>
@@ -24021,7 +24021,7 @@
           <a:graphicData uri="http://schemas.openxmlformats.org/presentationml/2006/ole">
             <mc:AlternateContent xmlns:mc="http://schemas.openxmlformats.org/markup-compatibility/2006">
               <mc:Choice xmlns:v="urn:schemas-microsoft-com:vml" Requires="v">
-                <p:oleObj spid="_x0000_s34860" name="Equation" r:id="rId5" imgW="3073320" imgH="1447560" progId="Equation.3">
+                <p:oleObj spid="_x0000_s34862" name="Equation" r:id="rId5" imgW="3073320" imgH="1447560" progId="Equation.3">
                   <p:embed/>
                 </p:oleObj>
               </mc:Choice>
@@ -24104,7 +24104,7 @@
           <a:graphicData uri="http://schemas.openxmlformats.org/presentationml/2006/ole">
             <mc:AlternateContent xmlns:mc="http://schemas.openxmlformats.org/markup-compatibility/2006">
               <mc:Choice xmlns:v="urn:schemas-microsoft-com:vml" Requires="v">
-                <p:oleObj spid="_x0000_s34861" name="Equation" r:id="rId7" imgW="3085920" imgH="1447560" progId="Equation.3">
+                <p:oleObj spid="_x0000_s34863" name="Equation" r:id="rId7" imgW="3085920" imgH="1447560" progId="Equation.3">
                   <p:embed/>
                 </p:oleObj>
               </mc:Choice>
@@ -24593,7 +24593,7 @@
           <a:graphicData uri="http://schemas.openxmlformats.org/presentationml/2006/ole">
             <mc:AlternateContent xmlns:mc="http://schemas.openxmlformats.org/markup-compatibility/2006">
               <mc:Choice xmlns:v="urn:schemas-microsoft-com:vml" Requires="v">
-                <p:oleObj spid="_x0000_s35865" name="Equation" r:id="rId4" imgW="3073320" imgH="1447560" progId="Equation.3">
+                <p:oleObj spid="_x0000_s35867" name="Equation" r:id="rId4" imgW="3073320" imgH="1447560" progId="Equation.3">
                   <p:embed/>
                 </p:oleObj>
               </mc:Choice>
@@ -24857,7 +24857,7 @@
           <a:graphicData uri="http://schemas.openxmlformats.org/presentationml/2006/ole">
             <mc:AlternateContent xmlns:mc="http://schemas.openxmlformats.org/markup-compatibility/2006">
               <mc:Choice xmlns:v="urn:schemas-microsoft-com:vml" Requires="v">
-                <p:oleObj spid="_x0000_s35866" name="Equation" r:id="rId9" imgW="3073320" imgH="1447560" progId="Equation.3">
+                <p:oleObj spid="_x0000_s35868" name="Equation" r:id="rId9" imgW="3073320" imgH="1447560" progId="Equation.3">
                   <p:embed/>
                 </p:oleObj>
               </mc:Choice>
@@ -25278,7 +25278,7 @@
           <a:graphicData uri="http://schemas.openxmlformats.org/presentationml/2006/ole">
             <mc:AlternateContent xmlns:mc="http://schemas.openxmlformats.org/markup-compatibility/2006">
               <mc:Choice xmlns:v="urn:schemas-microsoft-com:vml" Requires="v">
-                <p:oleObj spid="_x0000_s32861" name="Equation" r:id="rId3" imgW="3301920" imgH="228600" progId="Equation.3">
+                <p:oleObj spid="_x0000_s32863" name="Equation" r:id="rId3" imgW="3301920" imgH="228600" progId="Equation.3">
                   <p:embed/>
                 </p:oleObj>
               </mc:Choice>
@@ -25342,7 +25342,7 @@
           <a:graphicData uri="http://schemas.openxmlformats.org/presentationml/2006/ole">
             <mc:AlternateContent xmlns:mc="http://schemas.openxmlformats.org/markup-compatibility/2006">
               <mc:Choice xmlns:v="urn:schemas-microsoft-com:vml" Requires="v">
-                <p:oleObj spid="_x0000_s32862" name="Equation" r:id="rId5" imgW="3314520" imgH="228600" progId="Equation.3">
+                <p:oleObj spid="_x0000_s32864" name="Equation" r:id="rId5" imgW="3314520" imgH="228600" progId="Equation.3">
                   <p:embed/>
                 </p:oleObj>
               </mc:Choice>
@@ -26181,7 +26181,7 @@
           <a:graphicData uri="http://schemas.openxmlformats.org/presentationml/2006/ole">
             <mc:AlternateContent xmlns:mc="http://schemas.openxmlformats.org/markup-compatibility/2006">
               <mc:Choice xmlns:v="urn:schemas-microsoft-com:vml" Requires="v">
-                <p:oleObj spid="_x0000_s17477" name="Equation" r:id="rId3" imgW="3149280" imgH="469800" progId="Equation.3">
+                <p:oleObj spid="_x0000_s17478" name="Equation" r:id="rId3" imgW="3149280" imgH="469800" progId="Equation.3">
                   <p:embed/>
                 </p:oleObj>
               </mc:Choice>
@@ -26536,7 +26536,7 @@
           <a:graphicData uri="http://schemas.openxmlformats.org/presentationml/2006/ole">
             <mc:AlternateContent xmlns:mc="http://schemas.openxmlformats.org/markup-compatibility/2006">
               <mc:Choice xmlns:v="urn:schemas-microsoft-com:vml" Requires="v">
-                <p:oleObj spid="_x0000_s18563" name="Equation" r:id="rId3" imgW="3377880" imgH="469800" progId="Equation.3">
+                <p:oleObj spid="_x0000_s18565" name="Equation" r:id="rId3" imgW="3377880" imgH="469800" progId="Equation.3">
                   <p:embed/>
                 </p:oleObj>
               </mc:Choice>
@@ -26600,7 +26600,7 @@
           <a:graphicData uri="http://schemas.openxmlformats.org/presentationml/2006/ole">
             <mc:AlternateContent xmlns:mc="http://schemas.openxmlformats.org/markup-compatibility/2006">
               <mc:Choice xmlns:v="urn:schemas-microsoft-com:vml" Requires="v">
-                <p:oleObj spid="_x0000_s18564" name="Equation" r:id="rId5" imgW="3377880" imgH="469800" progId="Equation.3">
+                <p:oleObj spid="_x0000_s18566" name="Equation" r:id="rId5" imgW="3377880" imgH="469800" progId="Equation.3">
                   <p:embed/>
                 </p:oleObj>
               </mc:Choice>
@@ -27195,7 +27195,7 @@
           <a:graphicData uri="http://schemas.openxmlformats.org/presentationml/2006/ole">
             <mc:AlternateContent xmlns:mc="http://schemas.openxmlformats.org/markup-compatibility/2006">
               <mc:Choice xmlns:v="urn:schemas-microsoft-com:vml" Requires="v">
-                <p:oleObj spid="_x0000_s19587" name="Equation" r:id="rId4" imgW="3377880" imgH="469800" progId="Equation.3">
+                <p:oleObj spid="_x0000_s19589" name="Equation" r:id="rId4" imgW="3377880" imgH="469800" progId="Equation.3">
                   <p:embed/>
                 </p:oleObj>
               </mc:Choice>
@@ -27284,7 +27284,7 @@
           <a:graphicData uri="http://schemas.openxmlformats.org/presentationml/2006/ole">
             <mc:AlternateContent xmlns:mc="http://schemas.openxmlformats.org/markup-compatibility/2006">
               <mc:Choice xmlns:v="urn:schemas-microsoft-com:vml" Requires="v">
-                <p:oleObj spid="_x0000_s19588" name="Equation" r:id="rId6" imgW="3187440" imgH="469800" progId="Equation.3">
+                <p:oleObj spid="_x0000_s19590" name="Equation" r:id="rId6" imgW="3187440" imgH="469800" progId="Equation.3">
                   <p:embed/>
                 </p:oleObj>
               </mc:Choice>

</xml_diff>

<commit_message>
Minor updates for consistency and spelling
</commit_message>
<xml_diff>
--- a/University of Washington Class/Module 4 - Voltage control devices.pptx
+++ b/University of Washington Class/Module 4 - Voltage control devices.pptx
@@ -30,7 +30,7 @@
     <p:sldId id="257" r:id="rId21"/>
     <p:sldId id="274" r:id="rId22"/>
     <p:sldId id="275" r:id="rId23"/>
-    <p:sldId id="356" r:id="rId24"/>
+    <p:sldId id="369" r:id="rId24"/>
     <p:sldId id="282" r:id="rId25"/>
     <p:sldId id="276" r:id="rId26"/>
     <p:sldId id="338" r:id="rId27"/>
@@ -262,7 +262,7 @@
             <a:fld id="{30456DE2-1550-4DE2-8C7A-8D9992B45402}" type="datetimeFigureOut">
               <a:rPr lang="en-US" smtClean="0"/>
               <a:pPr/>
-              <a:t>12/7/2011</a:t>
+              <a:t>12/19/2011</a:t>
             </a:fld>
             <a:endParaRPr lang="en-US"/>
           </a:p>
@@ -714,7 +714,7 @@
           <a:p>
             <a:fld id="{F5373481-B42A-4D4F-86EA-A88290C58964}" type="datetime1">
               <a:rPr lang="en-US" smtClean="0"/>
-              <a:t>12/7/2011</a:t>
+              <a:t>12/19/2011</a:t>
             </a:fld>
             <a:endParaRPr lang="en-US"/>
           </a:p>
@@ -983,7 +983,7 @@
           <a:p>
             <a:fld id="{03F670FF-8926-4709-96F6-FC2958129ED2}" type="datetime1">
               <a:rPr lang="en-US" smtClean="0"/>
-              <a:t>12/7/2011</a:t>
+              <a:t>12/19/2011</a:t>
             </a:fld>
             <a:endParaRPr lang="en-US"/>
           </a:p>
@@ -1159,7 +1159,7 @@
           <a:p>
             <a:fld id="{1BF16CE4-EFFC-4BDF-B5A4-4A15C47E021B}" type="datetime1">
               <a:rPr lang="en-US" smtClean="0"/>
-              <a:t>12/7/2011</a:t>
+              <a:t>12/19/2011</a:t>
             </a:fld>
             <a:endParaRPr lang="en-US"/>
           </a:p>
@@ -1349,7 +1349,7 @@
           <a:p>
             <a:fld id="{D89124DC-29B6-4231-9D25-0C78D5EFDDC9}" type="datetime1">
               <a:rPr lang="en-US" smtClean="0"/>
-              <a:t>12/7/2011</a:t>
+              <a:t>12/19/2011</a:t>
             </a:fld>
             <a:endParaRPr lang="en-US" dirty="0"/>
           </a:p>
@@ -1598,7 +1598,7 @@
           <a:p>
             <a:fld id="{63DA24F3-3618-4EAF-A9E8-EEFE221E1493}" type="datetime1">
               <a:rPr lang="en-US" smtClean="0"/>
-              <a:t>12/7/2011</a:t>
+              <a:t>12/19/2011</a:t>
             </a:fld>
             <a:endParaRPr lang="en-US"/>
           </a:p>
@@ -1882,7 +1882,7 @@
           <a:p>
             <a:fld id="{69D8CDEA-265C-4EA9-A607-0D7D771780DB}" type="datetime1">
               <a:rPr lang="en-US" smtClean="0"/>
-              <a:t>12/7/2011</a:t>
+              <a:t>12/19/2011</a:t>
             </a:fld>
             <a:endParaRPr lang="en-US"/>
           </a:p>
@@ -2300,7 +2300,7 @@
           <a:p>
             <a:fld id="{ACFA6542-36F3-4A89-93B6-B9FED0856CDB}" type="datetime1">
               <a:rPr lang="en-US" smtClean="0"/>
-              <a:t>12/7/2011</a:t>
+              <a:t>12/19/2011</a:t>
             </a:fld>
             <a:endParaRPr lang="en-US"/>
           </a:p>
@@ -2414,7 +2414,7 @@
           <a:p>
             <a:fld id="{AE3B9829-009A-44FD-B649-E323418E7E5E}" type="datetime1">
               <a:rPr lang="en-US" smtClean="0"/>
-              <a:t>12/7/2011</a:t>
+              <a:t>12/19/2011</a:t>
             </a:fld>
             <a:endParaRPr lang="en-US"/>
           </a:p>
@@ -2505,7 +2505,7 @@
           <a:p>
             <a:fld id="{4391B5C5-7D92-4C37-8071-F3311CBE73D5}" type="datetime1">
               <a:rPr lang="en-US" smtClean="0"/>
-              <a:t>12/7/2011</a:t>
+              <a:t>12/19/2011</a:t>
             </a:fld>
             <a:endParaRPr lang="en-US"/>
           </a:p>
@@ -2778,7 +2778,7 @@
           <a:p>
             <a:fld id="{4689F7FE-6C86-4059-B972-0BBDA5F301D9}" type="datetime1">
               <a:rPr lang="en-US" smtClean="0"/>
-              <a:t>12/7/2011</a:t>
+              <a:t>12/19/2011</a:t>
             </a:fld>
             <a:endParaRPr lang="en-US"/>
           </a:p>
@@ -3027,7 +3027,7 @@
           <a:p>
             <a:fld id="{F09338A6-2CCC-46F1-9871-B278557BB635}" type="datetime1">
               <a:rPr lang="en-US" smtClean="0"/>
-              <a:t>12/7/2011</a:t>
+              <a:t>12/19/2011</a:t>
             </a:fld>
             <a:endParaRPr lang="en-US"/>
           </a:p>
@@ -3240,7 +3240,7 @@
           <a:p>
             <a:fld id="{14FE97D8-1050-4CA4-8B4F-E964B5B645D9}" type="datetime1">
               <a:rPr lang="en-US" smtClean="0"/>
-              <a:t>12/7/2011</a:t>
+              <a:t>12/19/2011</a:t>
             </a:fld>
             <a:endParaRPr lang="en-US" dirty="0"/>
           </a:p>
@@ -4815,7 +4815,7 @@
           <a:graphicData uri="http://schemas.openxmlformats.org/presentationml/2006/ole">
             <mc:AlternateContent xmlns:mc="http://schemas.openxmlformats.org/markup-compatibility/2006">
               <mc:Choice xmlns:v="urn:schemas-microsoft-com:vml" Requires="v">
-                <p:oleObj spid="_x0000_s20647" name="Equation" r:id="rId7" imgW="1739880" imgH="228600" progId="Equation.3">
+                <p:oleObj spid="_x0000_s20656" name="Equation" r:id="rId7" imgW="1739880" imgH="228600" progId="Equation.3">
                   <p:embed/>
                 </p:oleObj>
               </mc:Choice>
@@ -4879,7 +4879,7 @@
           <a:graphicData uri="http://schemas.openxmlformats.org/presentationml/2006/ole">
             <mc:AlternateContent xmlns:mc="http://schemas.openxmlformats.org/markup-compatibility/2006">
               <mc:Choice xmlns:v="urn:schemas-microsoft-com:vml" Requires="v">
-                <p:oleObj spid="_x0000_s20648" name="Equation" r:id="rId9" imgW="2108160" imgH="228600" progId="Equation.3">
+                <p:oleObj spid="_x0000_s20657" name="Equation" r:id="rId9" imgW="2108160" imgH="228600" progId="Equation.3">
                   <p:embed/>
                 </p:oleObj>
               </mc:Choice>
@@ -4943,7 +4943,7 @@
           <a:graphicData uri="http://schemas.openxmlformats.org/presentationml/2006/ole">
             <mc:AlternateContent xmlns:mc="http://schemas.openxmlformats.org/markup-compatibility/2006">
               <mc:Choice xmlns:v="urn:schemas-microsoft-com:vml" Requires="v">
-                <p:oleObj spid="_x0000_s20649" name="Equation" r:id="rId11" imgW="1981080" imgH="253800" progId="Equation.3">
+                <p:oleObj spid="_x0000_s20658" name="Equation" r:id="rId11" imgW="1981080" imgH="253800" progId="Equation.3">
                   <p:embed/>
                 </p:oleObj>
               </mc:Choice>
@@ -6008,7 +6008,7 @@
           <a:graphicData uri="http://schemas.openxmlformats.org/presentationml/2006/ole">
             <mc:AlternateContent xmlns:mc="http://schemas.openxmlformats.org/markup-compatibility/2006">
               <mc:Choice xmlns:v="urn:schemas-microsoft-com:vml" Requires="v">
-                <p:oleObj spid="_x0000_s24630" name="Equation" r:id="rId3" imgW="850680" imgH="431640" progId="Equation.3">
+                <p:oleObj spid="_x0000_s24633" name="Equation" r:id="rId3" imgW="850680" imgH="431640" progId="Equation.3">
                   <p:embed/>
                 </p:oleObj>
               </mc:Choice>
@@ -6334,7 +6334,7 @@
           <a:graphicData uri="http://schemas.openxmlformats.org/presentationml/2006/ole">
             <mc:AlternateContent xmlns:mc="http://schemas.openxmlformats.org/markup-compatibility/2006">
               <mc:Choice xmlns:v="urn:schemas-microsoft-com:vml" Requires="v">
-                <p:oleObj spid="_x0000_s25693" name="Equation" r:id="rId3" imgW="850680" imgH="431640" progId="Equation.3">
+                <p:oleObj spid="_x0000_s25699" name="Equation" r:id="rId3" imgW="850680" imgH="431640" progId="Equation.3">
                   <p:embed/>
                 </p:oleObj>
               </mc:Choice>
@@ -6423,7 +6423,7 @@
           <a:graphicData uri="http://schemas.openxmlformats.org/presentationml/2006/ole">
             <mc:AlternateContent xmlns:mc="http://schemas.openxmlformats.org/markup-compatibility/2006">
               <mc:Choice xmlns:v="urn:schemas-microsoft-com:vml" Requires="v">
-                <p:oleObj spid="_x0000_s25694" name="Equation" r:id="rId5" imgW="850680" imgH="431640" progId="Equation.3">
+                <p:oleObj spid="_x0000_s25700" name="Equation" r:id="rId5" imgW="850680" imgH="431640" progId="Equation.3">
                   <p:embed/>
                 </p:oleObj>
               </mc:Choice>
@@ -6837,7 +6837,15 @@
           <a:p>
             <a:r>
               <a:rPr lang="en-US" sz="2000" dirty="0" smtClean="0"/>
-              <a:t>Voltage regulators are variable tap position devices, an autotransformer, that change the effective turns ration of a single coil autotransformer.</a:t>
+              <a:t>Voltage regulators are variable tap position devices, an autotransformer, that change the effective turns </a:t>
+            </a:r>
+            <a:r>
+              <a:rPr lang="en-US" sz="2000" dirty="0" smtClean="0"/>
+              <a:t>ratio </a:t>
+            </a:r>
+            <a:r>
+              <a:rPr lang="en-US" sz="2000" dirty="0" smtClean="0"/>
+              <a:t>of a single coil autotransformer.</a:t>
             </a:r>
           </a:p>
           <a:p>
@@ -7062,7 +7070,7 @@
           <a:graphicData uri="http://schemas.openxmlformats.org/presentationml/2006/ole">
             <mc:AlternateContent xmlns:mc="http://schemas.openxmlformats.org/markup-compatibility/2006">
               <mc:Choice xmlns:v="urn:schemas-microsoft-com:vml" Requires="v">
-                <p:oleObj spid="_x0000_s21639" name="Equation" r:id="rId3" imgW="850680" imgH="431640" progId="Equation.3">
+                <p:oleObj spid="_x0000_s21645" name="Equation" r:id="rId3" imgW="850680" imgH="431640" progId="Equation.3">
                   <p:embed/>
                 </p:oleObj>
               </mc:Choice>
@@ -7126,7 +7134,7 @@
           <a:graphicData uri="http://schemas.openxmlformats.org/presentationml/2006/ole">
             <mc:AlternateContent xmlns:mc="http://schemas.openxmlformats.org/markup-compatibility/2006">
               <mc:Choice xmlns:v="urn:schemas-microsoft-com:vml" Requires="v">
-                <p:oleObj spid="_x0000_s21640" name="Equation" r:id="rId5" imgW="1193760" imgH="431640" progId="Equation.3">
+                <p:oleObj spid="_x0000_s21646" name="Equation" r:id="rId5" imgW="1193760" imgH="431640" progId="Equation.3">
                   <p:embed/>
                 </p:oleObj>
               </mc:Choice>
@@ -7763,13 +7771,29 @@
           <a:p>
             <a:r>
               <a:rPr lang="en-US" sz="2000" dirty="0" smtClean="0"/>
-              <a:t>The voltage is determined by the transmission level voltage and the turns ration of the substation transformer.</a:t>
-            </a:r>
-          </a:p>
-          <a:p>
+              <a:t>The voltage is determined by the transmission level voltage and the turns </a:t>
+            </a:r>
             <a:r>
               <a:rPr lang="en-US" sz="2000" dirty="0" smtClean="0"/>
-              <a:t>This is a low cost design but it lack flexibility.</a:t>
+              <a:t>ratio </a:t>
+            </a:r>
+            <a:r>
+              <a:rPr lang="en-US" sz="2000" dirty="0" smtClean="0"/>
+              <a:t>of the substation transformer.</a:t>
+            </a:r>
+          </a:p>
+          <a:p>
+            <a:r>
+              <a:rPr lang="en-US" sz="2000" dirty="0" smtClean="0"/>
+              <a:t>This is a low cost design but it </a:t>
+            </a:r>
+            <a:r>
+              <a:rPr lang="en-US" sz="2000" dirty="0" smtClean="0"/>
+              <a:t>lacks </a:t>
+            </a:r>
+            <a:r>
+              <a:rPr lang="en-US" sz="2000" dirty="0" smtClean="0"/>
+              <a:t>flexibility.</a:t>
             </a:r>
             <a:endParaRPr lang="en-US" sz="2000" dirty="0"/>
           </a:p>
@@ -8064,7 +8088,12 @@
             <p:ph type="body" idx="1"/>
           </p:nvPr>
         </p:nvSpPr>
-        <p:spPr/>
+        <p:spPr>
+          <a:xfrm>
+            <a:off x="2571750" y="1114425"/>
+            <a:ext cx="4040188" cy="639762"/>
+          </a:xfrm>
+        </p:spPr>
         <p:txBody>
           <a:bodyPr/>
           <a:lstStyle/>
@@ -8088,7 +8117,12 @@
             <p:ph type="body" sz="quarter" idx="3"/>
           </p:nvPr>
         </p:nvSpPr>
-        <p:spPr/>
+        <p:spPr>
+          <a:xfrm>
+            <a:off x="2549525" y="3886200"/>
+            <a:ext cx="4041775" cy="639762"/>
+          </a:xfrm>
+        </p:spPr>
         <p:txBody>
           <a:bodyPr/>
           <a:lstStyle/>
@@ -8127,8 +8161,8 @@
         </p:blipFill>
         <p:spPr bwMode="auto">
           <a:xfrm>
-            <a:off x="4645025" y="3550755"/>
-            <a:ext cx="4041775" cy="1199528"/>
+            <a:off x="873192" y="4511040"/>
+            <a:ext cx="7394508" cy="2194560"/>
           </a:xfrm>
           <a:prstGeom prst="rect">
             <a:avLst/>
@@ -8193,8 +8227,8 @@
         </p:blipFill>
         <p:spPr bwMode="auto">
           <a:xfrm>
-            <a:off x="457200" y="3550990"/>
-            <a:ext cx="4040188" cy="1199057"/>
+            <a:off x="882717" y="1752600"/>
+            <a:ext cx="7394508" cy="2194560"/>
           </a:xfrm>
           <a:prstGeom prst="rect">
             <a:avLst/>
@@ -8261,7 +8295,7 @@
     </p:spTree>
     <p:extLst>
       <p:ext uri="{BB962C8B-B14F-4D97-AF65-F5344CB8AC3E}">
-        <p14:creationId xmlns:p14="http://schemas.microsoft.com/office/powerpoint/2010/main" val="509553420"/>
+        <p14:creationId xmlns:p14="http://schemas.microsoft.com/office/powerpoint/2010/main" val="487878539"/>
       </p:ext>
     </p:extLst>
   </p:cSld>
@@ -9449,7 +9483,15 @@
           <a:p>
             <a:r>
               <a:rPr lang="en-US" sz="2000" dirty="0" smtClean="0"/>
-              <a:t>Because of the need for a truck role, these capacitors would generally be operated on a seasonal cycle.</a:t>
+              <a:t>Because of the need for a truck </a:t>
+            </a:r>
+            <a:r>
+              <a:rPr lang="en-US" sz="2000" dirty="0" smtClean="0"/>
+              <a:t>roll, </a:t>
+            </a:r>
+            <a:r>
+              <a:rPr lang="en-US" sz="2000" dirty="0" smtClean="0"/>
+              <a:t>these capacitors would generally be operated on a seasonal cycle.</a:t>
             </a:r>
           </a:p>
           <a:p>
@@ -9608,7 +9650,11 @@
           <a:p>
             <a:r>
               <a:rPr lang="en-US" sz="2000" dirty="0" smtClean="0"/>
-              <a:t>Voltage based control is appropriate when there are large daily variations in the feeder load.</a:t>
+              <a:t>Voltage-based </a:t>
+            </a:r>
+            <a:r>
+              <a:rPr lang="en-US" sz="2000" dirty="0" smtClean="0"/>
+              <a:t>control is appropriate when there are large daily variations in the feeder load.</a:t>
             </a:r>
           </a:p>
           <a:p>
@@ -9769,7 +9815,15 @@
           <a:p>
             <a:r>
               <a:rPr lang="en-US" sz="2000" dirty="0" smtClean="0"/>
-              <a:t>In a VAR based control system the reactive power flowing into the line connecting the capacitor is the control variable, not voltage.</a:t>
+              <a:t>In a </a:t>
+            </a:r>
+            <a:r>
+              <a:rPr lang="en-US" sz="2000" dirty="0" smtClean="0"/>
+              <a:t>VAR-based </a:t>
+            </a:r>
+            <a:r>
+              <a:rPr lang="en-US" sz="2000" dirty="0" smtClean="0"/>
+              <a:t>control system the reactive power flowing into the line connecting the capacitor is the control variable, not voltage.</a:t>
             </a:r>
           </a:p>
           <a:p>
@@ -9964,7 +10018,15 @@
           <a:p>
             <a:r>
               <a:rPr lang="en-US" sz="2000" dirty="0" smtClean="0"/>
-              <a:t>In Volt-VAR control the reactive power flowing on the input line is still the main control value, but there is a voltage override which will then the capacitor off if the voltage is too high.</a:t>
+              <a:t>In Volt-VAR control the reactive power flowing on the input line is still the main control value, but there is a voltage override which will </a:t>
+            </a:r>
+            <a:r>
+              <a:rPr lang="en-US" sz="2000" dirty="0" smtClean="0"/>
+              <a:t>turn </a:t>
+            </a:r>
+            <a:r>
+              <a:rPr lang="en-US" sz="2000" dirty="0" smtClean="0"/>
+              <a:t>the capacitor off if the voltage is too high.</a:t>
             </a:r>
           </a:p>
           <a:p>
@@ -11223,7 +11285,7 @@
           <a:graphicData uri="http://schemas.openxmlformats.org/presentationml/2006/ole">
             <mc:AlternateContent xmlns:mc="http://schemas.openxmlformats.org/markup-compatibility/2006">
               <mc:Choice xmlns:v="urn:schemas-microsoft-com:vml" Requires="v">
-                <p:oleObj spid="_x0000_s2326" name="Equation" r:id="rId3" imgW="4203360" imgH="558720" progId="Equation.3">
+                <p:oleObj spid="_x0000_s2335" name="Equation" r:id="rId3" imgW="4203360" imgH="558720" progId="Equation.3">
                   <p:embed/>
                 </p:oleObj>
               </mc:Choice>
@@ -11291,7 +11353,7 @@
           <a:graphicData uri="http://schemas.openxmlformats.org/presentationml/2006/ole">
             <mc:AlternateContent xmlns:mc="http://schemas.openxmlformats.org/markup-compatibility/2006">
               <mc:Choice xmlns:v="urn:schemas-microsoft-com:vml" Requires="v">
-                <p:oleObj spid="_x0000_s2327" name="Equation" r:id="rId5" imgW="4165560" imgH="558720" progId="Equation.3">
+                <p:oleObj spid="_x0000_s2336" name="Equation" r:id="rId5" imgW="4165560" imgH="558720" progId="Equation.3">
                   <p:embed/>
                 </p:oleObj>
               </mc:Choice>
@@ -11359,7 +11421,7 @@
           <a:graphicData uri="http://schemas.openxmlformats.org/presentationml/2006/ole">
             <mc:AlternateContent xmlns:mc="http://schemas.openxmlformats.org/markup-compatibility/2006">
               <mc:Choice xmlns:v="urn:schemas-microsoft-com:vml" Requires="v">
-                <p:oleObj spid="_x0000_s2328" name="Equation" r:id="rId7" imgW="1015920" imgH="228600" progId="Equation.3">
+                <p:oleObj spid="_x0000_s2337" name="Equation" r:id="rId7" imgW="1015920" imgH="228600" progId="Equation.3">
                   <p:embed/>
                 </p:oleObj>
               </mc:Choice>
@@ -12520,7 +12582,7 @@
           <a:graphicData uri="http://schemas.openxmlformats.org/presentationml/2006/ole">
             <mc:AlternateContent xmlns:mc="http://schemas.openxmlformats.org/markup-compatibility/2006">
               <mc:Choice xmlns:v="urn:schemas-microsoft-com:vml" Requires="v">
-                <p:oleObj spid="_x0000_s16531" name="Equation" r:id="rId3" imgW="4965480" imgH="558720" progId="Equation.3">
+                <p:oleObj spid="_x0000_s16537" name="Equation" r:id="rId3" imgW="4965480" imgH="558720" progId="Equation.3">
                   <p:embed/>
                 </p:oleObj>
               </mc:Choice>
@@ -12590,7 +12652,7 @@
           <a:graphicData uri="http://schemas.openxmlformats.org/presentationml/2006/ole">
             <mc:AlternateContent xmlns:mc="http://schemas.openxmlformats.org/markup-compatibility/2006">
               <mc:Choice xmlns:v="urn:schemas-microsoft-com:vml" Requires="v">
-                <p:oleObj spid="_x0000_s16532" name="Equation" r:id="rId5" imgW="4927320" imgH="558720" progId="Equation.3">
+                <p:oleObj spid="_x0000_s16538" name="Equation" r:id="rId5" imgW="4927320" imgH="558720" progId="Equation.3">
                   <p:embed/>
                 </p:oleObj>
               </mc:Choice>
@@ -13102,7 +13164,15 @@
             <a:pPr lvl="1"/>
             <a:r>
               <a:rPr lang="en-US" dirty="0" smtClean="0"/>
-              <a:t>Construction of distribution line (impendence)</a:t>
+              <a:t>Construction of distribution line (</a:t>
+            </a:r>
+            <a:r>
+              <a:rPr lang="en-US" dirty="0" err="1" smtClean="0"/>
+              <a:t>impedence</a:t>
+            </a:r>
+            <a:r>
+              <a:rPr lang="en-US" dirty="0" smtClean="0"/>
+              <a:t>)</a:t>
             </a:r>
           </a:p>
           <a:p>
@@ -14718,6 +14788,30 @@
               <a:t>I</a:t>
             </a:r>
             <a:r>
+              <a:rPr lang="en-US" i="1" baseline="-25000" dirty="0" smtClean="0">
+                <a:cs typeface="Times New Roman" pitchFamily="18" charset="0"/>
+              </a:rPr>
+              <a:t>%</a:t>
+            </a:r>
+            <a:r>
+              <a:rPr lang="en-US" dirty="0">
+                <a:cs typeface="Times New Roman" pitchFamily="18" charset="0"/>
+              </a:rPr>
+              <a:t>,</a:t>
+            </a:r>
+            <a:r>
+              <a:rPr lang="en-US" dirty="0" smtClean="0">
+                <a:cs typeface="Times New Roman" pitchFamily="18" charset="0"/>
+              </a:rPr>
+              <a:t> </a:t>
+            </a:r>
+            <a:r>
+              <a:rPr lang="en-US" i="1" dirty="0">
+                <a:cs typeface="Times New Roman" pitchFamily="18" charset="0"/>
+              </a:rPr>
+              <a:t>P</a:t>
+            </a:r>
+            <a:r>
               <a:rPr lang="en-US" i="1" baseline="-25000" dirty="0">
                 <a:cs typeface="Times New Roman" pitchFamily="18" charset="0"/>
               </a:rPr>
@@ -14727,19 +14821,19 @@
               <a:rPr lang="en-US" dirty="0">
                 <a:cs typeface="Times New Roman" pitchFamily="18" charset="0"/>
               </a:rPr>
-              <a:t>: </a:t>
-            </a:r>
-            <a:r>
-              <a:rPr lang="en-US" i="1" dirty="0">
+              <a:t>, </a:t>
+            </a:r>
+            <a:r>
+              <a:rPr lang="en-US" i="1" dirty="0" err="1">
                 <a:cs typeface="Times New Roman" pitchFamily="18" charset="0"/>
               </a:rPr>
-              <a:t>P</a:t>
-            </a:r>
-            <a:r>
-              <a:rPr lang="en-US" i="1" baseline="-25000" dirty="0">
+              <a:t>Z</a:t>
+            </a:r>
+            <a:r>
+              <a:rPr lang="en-US" i="1" baseline="-25000" dirty="0" err="1">
                 <a:cs typeface="Times New Roman" pitchFamily="18" charset="0"/>
               </a:rPr>
-              <a:t>%</a:t>
+              <a:t>θ</a:t>
             </a:r>
             <a:r>
               <a:rPr lang="en-US" dirty="0">
@@ -14751,7 +14845,7 @@
               <a:rPr lang="en-US" i="1" dirty="0" err="1">
                 <a:cs typeface="Times New Roman" pitchFamily="18" charset="0"/>
               </a:rPr>
-              <a:t>Z</a:t>
+              <a:t>I</a:t>
             </a:r>
             <a:r>
               <a:rPr lang="en-US" i="1" baseline="-25000" dirty="0" err="1">
@@ -14763,24 +14857,6 @@
               <a:rPr lang="en-US" dirty="0">
                 <a:cs typeface="Times New Roman" pitchFamily="18" charset="0"/>
               </a:rPr>
-              <a:t>, </a:t>
-            </a:r>
-            <a:r>
-              <a:rPr lang="en-US" i="1" dirty="0" err="1">
-                <a:cs typeface="Times New Roman" pitchFamily="18" charset="0"/>
-              </a:rPr>
-              <a:t>I</a:t>
-            </a:r>
-            <a:r>
-              <a:rPr lang="en-US" i="1" baseline="-25000" dirty="0" err="1">
-                <a:cs typeface="Times New Roman" pitchFamily="18" charset="0"/>
-              </a:rPr>
-              <a:t>θ</a:t>
-            </a:r>
-            <a:r>
-              <a:rPr lang="en-US" dirty="0">
-                <a:cs typeface="Times New Roman" pitchFamily="18" charset="0"/>
-              </a:rPr>
               <a:t>, and </a:t>
             </a:r>
             <a:r>
@@ -14803,14 +14879,18 @@
             </a:r>
             <a:r>
               <a:rPr lang="en-US" dirty="0" smtClean="0"/>
-              <a:t> in the ZIP model.</a:t>
-            </a:r>
-          </a:p>
-          <a:p>
+              <a:t> in the ZIP model</a:t>
+            </a:r>
             <a:r>
               <a:rPr lang="en-US" dirty="0" smtClean="0"/>
-              <a:t>  </a:t>
-            </a:r>
+              <a:t>.</a:t>
+            </a:r>
+          </a:p>
+          <a:p>
+            <a:pPr marL="457200" lvl="1" indent="0">
+              <a:buNone/>
+            </a:pPr>
+            <a:endParaRPr lang="en-US" dirty="0" smtClean="0"/>
           </a:p>
           <a:p>
             <a:r>
@@ -14837,7 +14917,7 @@
           <a:graphicData uri="http://schemas.openxmlformats.org/presentationml/2006/ole">
             <mc:AlternateContent xmlns:mc="http://schemas.openxmlformats.org/markup-compatibility/2006">
               <mc:Choice xmlns:v="urn:schemas-microsoft-com:vml" Requires="v">
-                <p:oleObj spid="_x0000_s27690" name="Equation" r:id="rId3" imgW="114120" imgH="215640" progId="Equation.3">
+                <p:oleObj spid="_x0000_s27694" name="Equation" r:id="rId3" imgW="114120" imgH="215640" progId="Equation.3">
                   <p:embed/>
                 </p:oleObj>
               </mc:Choice>
@@ -14997,7 +15077,7 @@
           <a:graphicData uri="http://schemas.openxmlformats.org/presentationml/2006/ole">
             <mc:AlternateContent xmlns:mc="http://schemas.openxmlformats.org/markup-compatibility/2006">
               <mc:Choice xmlns:v="urn:schemas-microsoft-com:vml" Requires="v">
-                <p:oleObj spid="_x0000_s10912" name="Equation" r:id="rId3" imgW="114120" imgH="215640" progId="Equation.3">
+                <p:oleObj spid="_x0000_s10936" name="Equation" r:id="rId3" imgW="114120" imgH="215640" progId="Equation.3">
                   <p:embed/>
                 </p:oleObj>
               </mc:Choice>
@@ -15067,7 +15147,7 @@
           <a:graphicData uri="http://schemas.openxmlformats.org/presentationml/2006/ole">
             <mc:AlternateContent xmlns:mc="http://schemas.openxmlformats.org/markup-compatibility/2006">
               <mc:Choice xmlns:v="urn:schemas-microsoft-com:vml" Requires="v">
-                <p:oleObj spid="_x0000_s10913" name="Equation" r:id="rId5" imgW="4076640" imgH="558720" progId="Equation.3">
+                <p:oleObj spid="_x0000_s10937" name="Equation" r:id="rId5" imgW="4076640" imgH="558720" progId="Equation.3">
                   <p:embed/>
                 </p:oleObj>
               </mc:Choice>
@@ -15137,7 +15217,7 @@
           <a:graphicData uri="http://schemas.openxmlformats.org/presentationml/2006/ole">
             <mc:AlternateContent xmlns:mc="http://schemas.openxmlformats.org/markup-compatibility/2006">
               <mc:Choice xmlns:v="urn:schemas-microsoft-com:vml" Requires="v">
-                <p:oleObj spid="_x0000_s10914" name="Equation" r:id="rId7" imgW="4038480" imgH="558720" progId="Equation.3">
+                <p:oleObj spid="_x0000_s10938" name="Equation" r:id="rId7" imgW="4038480" imgH="558720" progId="Equation.3">
                   <p:embed/>
                 </p:oleObj>
               </mc:Choice>
@@ -15213,7 +15293,7 @@
           <a:graphicData uri="http://schemas.openxmlformats.org/presentationml/2006/ole">
             <mc:AlternateContent xmlns:mc="http://schemas.openxmlformats.org/markup-compatibility/2006">
               <mc:Choice xmlns:v="urn:schemas-microsoft-com:vml" Requires="v">
-                <p:oleObj spid="_x0000_s10915" name="Equation" r:id="rId9" imgW="1777680" imgH="241200" progId="Equation.3">
+                <p:oleObj spid="_x0000_s10939" name="Equation" r:id="rId9" imgW="1777680" imgH="241200" progId="Equation.3">
                   <p:embed/>
                 </p:oleObj>
               </mc:Choice>
@@ -15283,7 +15363,7 @@
           <a:graphicData uri="http://schemas.openxmlformats.org/presentationml/2006/ole">
             <mc:AlternateContent xmlns:mc="http://schemas.openxmlformats.org/markup-compatibility/2006">
               <mc:Choice xmlns:v="urn:schemas-microsoft-com:vml" Requires="v">
-                <p:oleObj spid="_x0000_s10916" name="Equation" r:id="rId11" imgW="977760" imgH="228600" progId="Equation.3">
+                <p:oleObj spid="_x0000_s10940" name="Equation" r:id="rId11" imgW="977760" imgH="228600" progId="Equation.3">
                   <p:embed/>
                 </p:oleObj>
               </mc:Choice>
@@ -15353,7 +15433,7 @@
           <a:graphicData uri="http://schemas.openxmlformats.org/presentationml/2006/ole">
             <mc:AlternateContent xmlns:mc="http://schemas.openxmlformats.org/markup-compatibility/2006">
               <mc:Choice xmlns:v="urn:schemas-microsoft-com:vml" Requires="v">
-                <p:oleObj spid="_x0000_s10917" name="Equation" r:id="rId13" imgW="1536480" imgH="482400" progId="Equation.3">
+                <p:oleObj spid="_x0000_s10941" name="Equation" r:id="rId13" imgW="1536480" imgH="482400" progId="Equation.3">
                   <p:embed/>
                 </p:oleObj>
               </mc:Choice>
@@ -15423,7 +15503,7 @@
           <a:graphicData uri="http://schemas.openxmlformats.org/presentationml/2006/ole">
             <mc:AlternateContent xmlns:mc="http://schemas.openxmlformats.org/markup-compatibility/2006">
               <mc:Choice xmlns:v="urn:schemas-microsoft-com:vml" Requires="v">
-                <p:oleObj spid="_x0000_s10918" name="Equation" r:id="rId15" imgW="2145960" imgH="431640" progId="Equation.3">
+                <p:oleObj spid="_x0000_s10942" name="Equation" r:id="rId15" imgW="2145960" imgH="431640" progId="Equation.3">
                   <p:embed/>
                 </p:oleObj>
               </mc:Choice>
@@ -15493,7 +15573,7 @@
           <a:graphicData uri="http://schemas.openxmlformats.org/presentationml/2006/ole">
             <mc:AlternateContent xmlns:mc="http://schemas.openxmlformats.org/markup-compatibility/2006">
               <mc:Choice xmlns:v="urn:schemas-microsoft-com:vml" Requires="v">
-                <p:oleObj spid="_x0000_s10919" name="Equation" r:id="rId17" imgW="1612800" imgH="228600" progId="Equation.3">
+                <p:oleObj spid="_x0000_s10943" name="Equation" r:id="rId17" imgW="1612800" imgH="228600" progId="Equation.3">
                   <p:embed/>
                 </p:oleObj>
               </mc:Choice>
@@ -16387,7 +16467,7 @@
           <a:graphicData uri="http://schemas.openxmlformats.org/presentationml/2006/ole">
             <mc:AlternateContent xmlns:mc="http://schemas.openxmlformats.org/markup-compatibility/2006">
               <mc:Choice xmlns:v="urn:schemas-microsoft-com:vml" Requires="v">
-                <p:oleObj spid="_x0000_s28846" name="Equation" r:id="rId3" imgW="114120" imgH="215640" progId="Equation.3">
+                <p:oleObj spid="_x0000_s28858" name="Equation" r:id="rId3" imgW="114120" imgH="215640" progId="Equation.3">
                   <p:embed/>
                 </p:oleObj>
               </mc:Choice>
@@ -16463,7 +16543,7 @@
           <a:graphicData uri="http://schemas.openxmlformats.org/presentationml/2006/ole">
             <mc:AlternateContent xmlns:mc="http://schemas.openxmlformats.org/markup-compatibility/2006">
               <mc:Choice xmlns:v="urn:schemas-microsoft-com:vml" Requires="v">
-                <p:oleObj spid="_x0000_s28847" name="Equation" r:id="rId5" imgW="10756800" imgH="1143000" progId="Equation.3">
+                <p:oleObj spid="_x0000_s28859" name="Equation" r:id="rId5" imgW="10756800" imgH="1143000" progId="Equation.3">
                   <p:embed/>
                 </p:oleObj>
               </mc:Choice>
@@ -16525,7 +16605,7 @@
           <a:graphicData uri="http://schemas.openxmlformats.org/presentationml/2006/ole">
             <mc:AlternateContent xmlns:mc="http://schemas.openxmlformats.org/markup-compatibility/2006">
               <mc:Choice xmlns:v="urn:schemas-microsoft-com:vml" Requires="v">
-                <p:oleObj spid="_x0000_s28848" name="Equation" r:id="rId7" imgW="2145960" imgH="431640" progId="Equation.3">
+                <p:oleObj spid="_x0000_s28860" name="Equation" r:id="rId7" imgW="2145960" imgH="431640" progId="Equation.3">
                   <p:embed/>
                 </p:oleObj>
               </mc:Choice>
@@ -16614,7 +16694,7 @@
           <a:graphicData uri="http://schemas.openxmlformats.org/presentationml/2006/ole">
             <mc:AlternateContent xmlns:mc="http://schemas.openxmlformats.org/markup-compatibility/2006">
               <mc:Choice xmlns:v="urn:schemas-microsoft-com:vml" Requires="v">
-                <p:oleObj spid="_x0000_s28849" name="Equation" r:id="rId9" imgW="10553400" imgH="1143000" progId="Equation.3">
+                <p:oleObj spid="_x0000_s28861" name="Equation" r:id="rId9" imgW="10553400" imgH="1143000" progId="Equation.3">
                   <p:embed/>
                 </p:oleObj>
               </mc:Choice>
@@ -17129,7 +17209,7 @@
           <a:graphicData uri="http://schemas.openxmlformats.org/presentationml/2006/ole">
             <mc:AlternateContent xmlns:mc="http://schemas.openxmlformats.org/markup-compatibility/2006">
               <mc:Choice xmlns:v="urn:schemas-microsoft-com:vml" Requires="v">
-                <p:oleObj spid="_x0000_s11838" name="Equation" r:id="rId3" imgW="114120" imgH="215640" progId="Equation.3">
+                <p:oleObj spid="_x0000_s11859" name="Equation" r:id="rId3" imgW="114120" imgH="215640" progId="Equation.3">
                   <p:embed/>
                 </p:oleObj>
               </mc:Choice>
@@ -17199,7 +17279,7 @@
           <a:graphicData uri="http://schemas.openxmlformats.org/presentationml/2006/ole">
             <mc:AlternateContent xmlns:mc="http://schemas.openxmlformats.org/markup-compatibility/2006">
               <mc:Choice xmlns:v="urn:schemas-microsoft-com:vml" Requires="v">
-                <p:oleObj spid="_x0000_s11839" name="Equation" r:id="rId5" imgW="1803240" imgH="482400" progId="Equation.3">
+                <p:oleObj spid="_x0000_s11860" name="Equation" r:id="rId5" imgW="1803240" imgH="482400" progId="Equation.3">
                   <p:embed/>
                 </p:oleObj>
               </mc:Choice>
@@ -17269,7 +17349,7 @@
           <a:graphicData uri="http://schemas.openxmlformats.org/presentationml/2006/ole">
             <mc:AlternateContent xmlns:mc="http://schemas.openxmlformats.org/markup-compatibility/2006">
               <mc:Choice xmlns:v="urn:schemas-microsoft-com:vml" Requires="v">
-                <p:oleObj spid="_x0000_s11840" name="Equation" r:id="rId7" imgW="1790640" imgH="266400" progId="Equation.3">
+                <p:oleObj spid="_x0000_s11861" name="Equation" r:id="rId7" imgW="1790640" imgH="266400" progId="Equation.3">
                   <p:embed/>
                 </p:oleObj>
               </mc:Choice>
@@ -17345,7 +17425,7 @@
           <a:graphicData uri="http://schemas.openxmlformats.org/presentationml/2006/ole">
             <mc:AlternateContent xmlns:mc="http://schemas.openxmlformats.org/markup-compatibility/2006">
               <mc:Choice xmlns:v="urn:schemas-microsoft-com:vml" Requires="v">
-                <p:oleObj spid="_x0000_s11841" name="Equation" r:id="rId9" imgW="2145960" imgH="431640" progId="Equation.3">
+                <p:oleObj spid="_x0000_s11862" name="Equation" r:id="rId9" imgW="2145960" imgH="431640" progId="Equation.3">
                   <p:embed/>
                 </p:oleObj>
               </mc:Choice>
@@ -17409,7 +17489,7 @@
           <a:graphicData uri="http://schemas.openxmlformats.org/presentationml/2006/ole">
             <mc:AlternateContent xmlns:mc="http://schemas.openxmlformats.org/markup-compatibility/2006">
               <mc:Choice xmlns:v="urn:schemas-microsoft-com:vml" Requires="v">
-                <p:oleObj spid="_x0000_s11842" name="Equation" r:id="rId11" imgW="2450880" imgH="228600" progId="Equation.3">
+                <p:oleObj spid="_x0000_s11863" name="Equation" r:id="rId11" imgW="2450880" imgH="228600" progId="Equation.3">
                   <p:embed/>
                 </p:oleObj>
               </mc:Choice>
@@ -17479,7 +17559,7 @@
           <a:graphicData uri="http://schemas.openxmlformats.org/presentationml/2006/ole">
             <mc:AlternateContent xmlns:mc="http://schemas.openxmlformats.org/markup-compatibility/2006">
               <mc:Choice xmlns:v="urn:schemas-microsoft-com:vml" Requires="v">
-                <p:oleObj spid="_x0000_s11843" name="Equation" r:id="rId13" imgW="634680" imgH="215640" progId="Equation.3">
+                <p:oleObj spid="_x0000_s11864" name="Equation" r:id="rId13" imgW="634680" imgH="215640" progId="Equation.3">
                   <p:embed/>
                 </p:oleObj>
               </mc:Choice>
@@ -17609,7 +17689,7 @@
           <a:graphicData uri="http://schemas.openxmlformats.org/presentationml/2006/ole">
             <mc:AlternateContent xmlns:mc="http://schemas.openxmlformats.org/markup-compatibility/2006">
               <mc:Choice xmlns:v="urn:schemas-microsoft-com:vml" Requires="v">
-                <p:oleObj spid="_x0000_s11844" name="Equation" r:id="rId15" imgW="1333440" imgH="1218960" progId="Equation.3">
+                <p:oleObj spid="_x0000_s11865" name="Equation" r:id="rId15" imgW="1333440" imgH="1218960" progId="Equation.3">
                   <p:embed/>
                 </p:oleObj>
               </mc:Choice>
@@ -18344,7 +18424,7 @@
           <a:graphicData uri="http://schemas.openxmlformats.org/presentationml/2006/ole">
             <mc:AlternateContent xmlns:mc="http://schemas.openxmlformats.org/markup-compatibility/2006">
               <mc:Choice xmlns:v="urn:schemas-microsoft-com:vml" Requires="v">
-                <p:oleObj spid="_x0000_s12543" name="Equation" r:id="rId3" imgW="114120" imgH="215640" progId="Equation.3">
+                <p:oleObj spid="_x0000_s12549" name="Equation" r:id="rId3" imgW="114120" imgH="215640" progId="Equation.3">
                   <p:embed/>
                 </p:oleObj>
               </mc:Choice>
@@ -18420,7 +18500,7 @@
           <a:graphicData uri="http://schemas.openxmlformats.org/presentationml/2006/ole">
             <mc:AlternateContent xmlns:mc="http://schemas.openxmlformats.org/markup-compatibility/2006">
               <mc:Choice xmlns:v="urn:schemas-microsoft-com:vml" Requires="v">
-                <p:oleObj spid="_x0000_s12544" name="Equation" r:id="rId5" imgW="1015920" imgH="1612800" progId="Equation.3">
+                <p:oleObj spid="_x0000_s12550" name="Equation" r:id="rId5" imgW="1015920" imgH="1612800" progId="Equation.3">
                   <p:embed/>
                 </p:oleObj>
               </mc:Choice>
@@ -18889,7 +18969,7 @@
           <a:graphicData uri="http://schemas.openxmlformats.org/presentationml/2006/ole">
             <mc:AlternateContent xmlns:mc="http://schemas.openxmlformats.org/markup-compatibility/2006">
               <mc:Choice xmlns:v="urn:schemas-microsoft-com:vml" Requires="v">
-                <p:oleObj spid="_x0000_s30768" name="Equation" r:id="rId3" imgW="5333760" imgH="558720" progId="Equation.3">
+                <p:oleObj spid="_x0000_s30774" name="Equation" r:id="rId3" imgW="5333760" imgH="558720" progId="Equation.3">
                   <p:embed/>
                 </p:oleObj>
               </mc:Choice>
@@ -18953,7 +19033,7 @@
           <a:graphicData uri="http://schemas.openxmlformats.org/presentationml/2006/ole">
             <mc:AlternateContent xmlns:mc="http://schemas.openxmlformats.org/markup-compatibility/2006">
               <mc:Choice xmlns:v="urn:schemas-microsoft-com:vml" Requires="v">
-                <p:oleObj spid="_x0000_s30769" name="Equation" r:id="rId5" imgW="5295600" imgH="558720" progId="Equation.3">
+                <p:oleObj spid="_x0000_s30775" name="Equation" r:id="rId5" imgW="5295600" imgH="558720" progId="Equation.3">
                   <p:embed/>
                 </p:oleObj>
               </mc:Choice>
@@ -19637,7 +19717,7 @@
           <a:graphicData uri="http://schemas.openxmlformats.org/presentationml/2006/ole">
             <mc:AlternateContent xmlns:mc="http://schemas.openxmlformats.org/markup-compatibility/2006">
               <mc:Choice xmlns:v="urn:schemas-microsoft-com:vml" Requires="v">
-                <p:oleObj spid="_x0000_s29736" name="Equation" r:id="rId3" imgW="1942920" imgH="761760" progId="Equation.3">
+                <p:oleObj spid="_x0000_s29739" name="Equation" r:id="rId3" imgW="1942920" imgH="761760" progId="Equation.3">
                   <p:embed/>
                 </p:oleObj>
               </mc:Choice>
@@ -19846,7 +19926,15 @@
           <a:p>
             <a:r>
               <a:rPr lang="en-US" sz="2000" dirty="0" smtClean="0"/>
-              <a:t>As a result, the amount of time the unit must consume electricity, i.e. time it is on, will vary based on the line voltage.</a:t>
+              <a:t>As a result, the amount of time the unit must consume electricity, i.e</a:t>
+            </a:r>
+            <a:r>
+              <a:rPr lang="en-US" sz="2000" dirty="0" smtClean="0"/>
+              <a:t>., </a:t>
+            </a:r>
+            <a:r>
+              <a:rPr lang="en-US" sz="2000" dirty="0" smtClean="0"/>
+              <a:t>time it is on, will vary based on the line voltage.</a:t>
             </a:r>
           </a:p>
           <a:p>
@@ -20894,7 +20982,7 @@
           <a:graphicData uri="http://schemas.openxmlformats.org/presentationml/2006/ole">
             <mc:AlternateContent xmlns:mc="http://schemas.openxmlformats.org/markup-compatibility/2006">
               <mc:Choice xmlns:v="urn:schemas-microsoft-com:vml" Requires="v">
-                <p:oleObj spid="_x0000_s3234" name="Equation" r:id="rId4" imgW="3759120" imgH="431640" progId="Equation.3">
+                <p:oleObj spid="_x0000_s3240" name="Equation" r:id="rId4" imgW="3759120" imgH="431640" progId="Equation.3">
                   <p:embed/>
                 </p:oleObj>
               </mc:Choice>
@@ -20962,7 +21050,7 @@
           <a:graphicData uri="http://schemas.openxmlformats.org/presentationml/2006/ole">
             <mc:AlternateContent xmlns:mc="http://schemas.openxmlformats.org/markup-compatibility/2006">
               <mc:Choice xmlns:v="urn:schemas-microsoft-com:vml" Requires="v">
-                <p:oleObj spid="_x0000_s3235" name="Equation" r:id="rId6" imgW="2489040" imgH="431640" progId="Equation.3">
+                <p:oleObj spid="_x0000_s3241" name="Equation" r:id="rId6" imgW="2489040" imgH="431640" progId="Equation.3">
                   <p:embed/>
                 </p:oleObj>
               </mc:Choice>
@@ -21333,7 +21421,15 @@
             </a:r>
             <a:r>
               <a:rPr lang="en-US" sz="1600" dirty="0" smtClean="0"/>
-              <a:t>: The temperate below which the auxiliary heating elements turn on.</a:t>
+              <a:t>: The </a:t>
+            </a:r>
+            <a:r>
+              <a:rPr lang="en-US" sz="1600" dirty="0" smtClean="0"/>
+              <a:t>temperature </a:t>
+            </a:r>
+            <a:r>
+              <a:rPr lang="en-US" sz="1600" dirty="0" smtClean="0"/>
+              <a:t>below which the auxiliary heating elements turn on.</a:t>
             </a:r>
             <a:endParaRPr lang="en-US" sz="1600" dirty="0"/>
           </a:p>
@@ -21459,7 +21555,15 @@
           <a:p>
             <a:r>
               <a:rPr lang="en-US" sz="2000" dirty="0" smtClean="0"/>
-              <a:t>The voltage supplied to the customer is generally maintained within the limits set by ANCI C84.1.</a:t>
+              <a:t>The voltage supplied to the customer is generally maintained within the limits set by </a:t>
+            </a:r>
+            <a:r>
+              <a:rPr lang="en-US" sz="2000" dirty="0" smtClean="0"/>
+              <a:t>ANSI </a:t>
+            </a:r>
+            <a:r>
+              <a:rPr lang="en-US" sz="2000" dirty="0" smtClean="0"/>
+              <a:t>C84.1.</a:t>
             </a:r>
           </a:p>
           <a:p>
@@ -21648,7 +21752,7 @@
           <a:graphicData uri="http://schemas.openxmlformats.org/presentationml/2006/ole">
             <mc:AlternateContent xmlns:mc="http://schemas.openxmlformats.org/markup-compatibility/2006">
               <mc:Choice xmlns:v="urn:schemas-microsoft-com:vml" Requires="v">
-                <p:oleObj spid="_x0000_s4181" r:id="rId3" imgW="3235112" imgH="3234987" progId="Msxml2.SAXXMLReader.5.0">
+                <p:oleObj spid="_x0000_s4184" r:id="rId3" imgW="3235112" imgH="3234987" progId="Msxml2.SAXXMLReader.5.0">
                   <p:embed/>
                 </p:oleObj>
               </mc:Choice>
@@ -23166,7 +23270,7 @@
           <a:graphicData uri="http://schemas.openxmlformats.org/presentationml/2006/ole">
             <mc:AlternateContent xmlns:mc="http://schemas.openxmlformats.org/markup-compatibility/2006">
               <mc:Choice xmlns:v="urn:schemas-microsoft-com:vml" Requires="v">
-                <p:oleObj spid="_x0000_s33839" name="Equation" r:id="rId5" imgW="3073320" imgH="1447560" progId="Equation.3">
+                <p:oleObj spid="_x0000_s33845" name="Equation" r:id="rId5" imgW="3073320" imgH="1447560" progId="Equation.3">
                   <p:embed/>
                 </p:oleObj>
               </mc:Choice>
@@ -23249,7 +23353,7 @@
           <a:graphicData uri="http://schemas.openxmlformats.org/presentationml/2006/ole">
             <mc:AlternateContent xmlns:mc="http://schemas.openxmlformats.org/markup-compatibility/2006">
               <mc:Choice xmlns:v="urn:schemas-microsoft-com:vml" Requires="v">
-                <p:oleObj spid="_x0000_s33840" name="Equation" r:id="rId7" imgW="3073320" imgH="1447560" progId="Equation.3">
+                <p:oleObj spid="_x0000_s33846" name="Equation" r:id="rId7" imgW="3073320" imgH="1447560" progId="Equation.3">
                   <p:embed/>
                 </p:oleObj>
               </mc:Choice>
@@ -23593,6 +23697,37 @@
                                   </p:childTnLst>
                                 </p:cTn>
                               </p:par>
+                              <p:par>
+                                <p:cTn id="13" presetID="1" presetClass="entr" presetSubtype="0" fill="hold" grpId="0" nodeType="withEffect">
+                                  <p:stCondLst>
+                                    <p:cond delay="0"/>
+                                  </p:stCondLst>
+                                  <p:childTnLst>
+                                    <p:set>
+                                      <p:cBhvr>
+                                        <p:cTn id="14" dur="1" fill="hold">
+                                          <p:stCondLst>
+                                            <p:cond delay="0"/>
+                                          </p:stCondLst>
+                                        </p:cTn>
+                                        <p:tgtEl>
+                                          <p:spTgt spid="7">
+                                            <p:txEl>
+                                              <p:pRg st="0" end="0"/>
+                                            </p:txEl>
+                                          </p:spTgt>
+                                        </p:tgtEl>
+                                        <p:attrNameLst>
+                                          <p:attrName>style.visibility</p:attrName>
+                                        </p:attrNameLst>
+                                      </p:cBhvr>
+                                      <p:to>
+                                        <p:strVal val="visible"/>
+                                      </p:to>
+                                    </p:set>
+                                  </p:childTnLst>
+                                </p:cTn>
+                              </p:par>
                             </p:childTnLst>
                           </p:cTn>
                         </p:par>
@@ -23600,26 +23735,26 @@
                     </p:cTn>
                   </p:par>
                   <p:par>
-                    <p:cTn id="13" fill="hold">
+                    <p:cTn id="15" fill="hold">
                       <p:stCondLst>
                         <p:cond delay="indefinite"/>
                       </p:stCondLst>
                       <p:childTnLst>
                         <p:par>
-                          <p:cTn id="14" fill="hold">
+                          <p:cTn id="16" fill="hold">
                             <p:stCondLst>
                               <p:cond delay="0"/>
                             </p:stCondLst>
                             <p:childTnLst>
                               <p:par>
-                                <p:cTn id="15" presetID="1" presetClass="entr" presetSubtype="0" fill="hold" nodeType="clickEffect">
+                                <p:cTn id="17" presetID="1" presetClass="entr" presetSubtype="0" fill="hold" nodeType="clickEffect">
                                   <p:stCondLst>
                                     <p:cond delay="0"/>
                                   </p:stCondLst>
                                   <p:childTnLst>
                                     <p:set>
                                       <p:cBhvr>
-                                        <p:cTn id="16" dur="1" fill="hold">
+                                        <p:cTn id="18" dur="1" fill="hold">
                                           <p:stCondLst>
                                             <p:cond delay="0"/>
                                           </p:stCondLst>
@@ -23665,6 +23800,9 @@
         </p:cTn>
       </p:par>
     </p:tnLst>
+    <p:bldLst>
+      <p:bldP spid="7" grpId="0" build="p"/>
+    </p:bldLst>
   </p:timing>
 </p:sld>
 </file>
@@ -24064,7 +24202,7 @@
           <a:graphicData uri="http://schemas.openxmlformats.org/presentationml/2006/ole">
             <mc:AlternateContent xmlns:mc="http://schemas.openxmlformats.org/markup-compatibility/2006">
               <mc:Choice xmlns:v="urn:schemas-microsoft-com:vml" Requires="v">
-                <p:oleObj spid="_x0000_s34868" name="Equation" r:id="rId5" imgW="3073320" imgH="1447560" progId="Equation.3">
+                <p:oleObj spid="_x0000_s34874" name="Equation" r:id="rId5" imgW="3073320" imgH="1447560" progId="Equation.3">
                   <p:embed/>
                 </p:oleObj>
               </mc:Choice>
@@ -24147,7 +24285,7 @@
           <a:graphicData uri="http://schemas.openxmlformats.org/presentationml/2006/ole">
             <mc:AlternateContent xmlns:mc="http://schemas.openxmlformats.org/markup-compatibility/2006">
               <mc:Choice xmlns:v="urn:schemas-microsoft-com:vml" Requires="v">
-                <p:oleObj spid="_x0000_s34869" name="Equation" r:id="rId7" imgW="3085920" imgH="1447560" progId="Equation.3">
+                <p:oleObj spid="_x0000_s34875" name="Equation" r:id="rId7" imgW="3085920" imgH="1447560" progId="Equation.3">
                   <p:embed/>
                 </p:oleObj>
               </mc:Choice>
@@ -24636,7 +24774,7 @@
           <a:graphicData uri="http://schemas.openxmlformats.org/presentationml/2006/ole">
             <mc:AlternateContent xmlns:mc="http://schemas.openxmlformats.org/markup-compatibility/2006">
               <mc:Choice xmlns:v="urn:schemas-microsoft-com:vml" Requires="v">
-                <p:oleObj spid="_x0000_s35873" name="Equation" r:id="rId4" imgW="3073320" imgH="1447560" progId="Equation.3">
+                <p:oleObj spid="_x0000_s35879" name="Equation" r:id="rId4" imgW="3073320" imgH="1447560" progId="Equation.3">
                   <p:embed/>
                 </p:oleObj>
               </mc:Choice>
@@ -24900,7 +25038,7 @@
           <a:graphicData uri="http://schemas.openxmlformats.org/presentationml/2006/ole">
             <mc:AlternateContent xmlns:mc="http://schemas.openxmlformats.org/markup-compatibility/2006">
               <mc:Choice xmlns:v="urn:schemas-microsoft-com:vml" Requires="v">
-                <p:oleObj spid="_x0000_s35874" name="Equation" r:id="rId9" imgW="3073320" imgH="1447560" progId="Equation.3">
+                <p:oleObj spid="_x0000_s35880" name="Equation" r:id="rId9" imgW="3073320" imgH="1447560" progId="Equation.3">
                   <p:embed/>
                 </p:oleObj>
               </mc:Choice>
@@ -25114,6 +25252,37 @@
                                   </p:childTnLst>
                                 </p:cTn>
                               </p:par>
+                              <p:par>
+                                <p:cTn id="13" presetID="1" presetClass="entr" presetSubtype="0" fill="hold" grpId="0" nodeType="withEffect">
+                                  <p:stCondLst>
+                                    <p:cond delay="0"/>
+                                  </p:stCondLst>
+                                  <p:childTnLst>
+                                    <p:set>
+                                      <p:cBhvr>
+                                        <p:cTn id="14" dur="1" fill="hold">
+                                          <p:stCondLst>
+                                            <p:cond delay="0"/>
+                                          </p:stCondLst>
+                                        </p:cTn>
+                                        <p:tgtEl>
+                                          <p:spTgt spid="9">
+                                            <p:txEl>
+                                              <p:pRg st="0" end="0"/>
+                                            </p:txEl>
+                                          </p:spTgt>
+                                        </p:tgtEl>
+                                        <p:attrNameLst>
+                                          <p:attrName>style.visibility</p:attrName>
+                                        </p:attrNameLst>
+                                      </p:cBhvr>
+                                      <p:to>
+                                        <p:strVal val="visible"/>
+                                      </p:to>
+                                    </p:set>
+                                  </p:childTnLst>
+                                </p:cTn>
+                              </p:par>
                             </p:childTnLst>
                           </p:cTn>
                         </p:par>
@@ -25121,26 +25290,26 @@
                     </p:cTn>
                   </p:par>
                   <p:par>
-                    <p:cTn id="13" fill="hold">
+                    <p:cTn id="15" fill="hold">
                       <p:stCondLst>
                         <p:cond delay="indefinite"/>
                       </p:stCondLst>
                       <p:childTnLst>
                         <p:par>
-                          <p:cTn id="14" fill="hold">
+                          <p:cTn id="16" fill="hold">
                             <p:stCondLst>
                               <p:cond delay="0"/>
                             </p:stCondLst>
                             <p:childTnLst>
                               <p:par>
-                                <p:cTn id="15" presetID="1" presetClass="entr" presetSubtype="0" fill="hold" nodeType="clickEffect">
+                                <p:cTn id="17" presetID="1" presetClass="entr" presetSubtype="0" fill="hold" nodeType="clickEffect">
                                   <p:stCondLst>
                                     <p:cond delay="0"/>
                                   </p:stCondLst>
                                   <p:childTnLst>
                                     <p:set>
                                       <p:cBhvr>
-                                        <p:cTn id="16" dur="1" fill="hold">
+                                        <p:cTn id="18" dur="1" fill="hold">
                                           <p:stCondLst>
                                             <p:cond delay="0"/>
                                           </p:stCondLst>
@@ -25186,6 +25355,9 @@
         </p:cTn>
       </p:par>
     </p:tnLst>
+    <p:bldLst>
+      <p:bldP spid="9" grpId="0" build="p"/>
+    </p:bldLst>
   </p:timing>
 </p:sld>
 </file>
@@ -25321,7 +25493,7 @@
           <a:graphicData uri="http://schemas.openxmlformats.org/presentationml/2006/ole">
             <mc:AlternateContent xmlns:mc="http://schemas.openxmlformats.org/markup-compatibility/2006">
               <mc:Choice xmlns:v="urn:schemas-microsoft-com:vml" Requires="v">
-                <p:oleObj spid="_x0000_s32869" name="Equation" r:id="rId3" imgW="3301920" imgH="228600" progId="Equation.3">
+                <p:oleObj spid="_x0000_s32875" name="Equation" r:id="rId3" imgW="3301920" imgH="228600" progId="Equation.3">
                   <p:embed/>
                 </p:oleObj>
               </mc:Choice>
@@ -25385,7 +25557,7 @@
           <a:graphicData uri="http://schemas.openxmlformats.org/presentationml/2006/ole">
             <mc:AlternateContent xmlns:mc="http://schemas.openxmlformats.org/markup-compatibility/2006">
               <mc:Choice xmlns:v="urn:schemas-microsoft-com:vml" Requires="v">
-                <p:oleObj spid="_x0000_s32870" name="Equation" r:id="rId5" imgW="3314520" imgH="228600" progId="Equation.3">
+                <p:oleObj spid="_x0000_s32876" name="Equation" r:id="rId5" imgW="3314520" imgH="228600" progId="Equation.3">
                   <p:embed/>
                 </p:oleObj>
               </mc:Choice>
@@ -25986,7 +26158,7 @@
                                 </p:cTn>
                               </p:par>
                               <p:par>
-                                <p:cTn id="9" presetID="1" presetClass="entr" presetSubtype="0" fill="hold" nodeType="withEffect">
+                                <p:cTn id="9" presetID="1" presetClass="entr" presetSubtype="0" fill="hold" grpId="0" nodeType="withEffect">
                                   <p:stCondLst>
                                     <p:cond delay="0"/>
                                   </p:stCondLst>
@@ -25994,6 +26166,37 @@
                                     <p:set>
                                       <p:cBhvr>
                                         <p:cTn id="10" dur="1" fill="hold">
+                                          <p:stCondLst>
+                                            <p:cond delay="0"/>
+                                          </p:stCondLst>
+                                        </p:cTn>
+                                        <p:tgtEl>
+                                          <p:spTgt spid="7">
+                                            <p:txEl>
+                                              <p:pRg st="0" end="0"/>
+                                            </p:txEl>
+                                          </p:spTgt>
+                                        </p:tgtEl>
+                                        <p:attrNameLst>
+                                          <p:attrName>style.visibility</p:attrName>
+                                        </p:attrNameLst>
+                                      </p:cBhvr>
+                                      <p:to>
+                                        <p:strVal val="visible"/>
+                                      </p:to>
+                                    </p:set>
+                                  </p:childTnLst>
+                                </p:cTn>
+                              </p:par>
+                              <p:par>
+                                <p:cTn id="11" presetID="1" presetClass="entr" presetSubtype="0" fill="hold" nodeType="withEffect">
+                                  <p:stCondLst>
+                                    <p:cond delay="0"/>
+                                  </p:stCondLst>
+                                  <p:childTnLst>
+                                    <p:set>
+                                      <p:cBhvr>
+                                        <p:cTn id="12" dur="1" fill="hold">
                                           <p:stCondLst>
                                             <p:cond delay="0"/>
                                           </p:stCondLst>
@@ -26019,26 +26222,26 @@
                     </p:cTn>
                   </p:par>
                   <p:par>
-                    <p:cTn id="11" fill="hold">
+                    <p:cTn id="13" fill="hold">
                       <p:stCondLst>
                         <p:cond delay="indefinite"/>
                       </p:stCondLst>
                       <p:childTnLst>
                         <p:par>
-                          <p:cTn id="12" fill="hold">
+                          <p:cTn id="14" fill="hold">
                             <p:stCondLst>
                               <p:cond delay="0"/>
                             </p:stCondLst>
                             <p:childTnLst>
                               <p:par>
-                                <p:cTn id="13" presetID="1" presetClass="entr" presetSubtype="0" fill="hold" grpId="0" nodeType="clickEffect">
+                                <p:cTn id="15" presetID="1" presetClass="entr" presetSubtype="0" fill="hold" grpId="0" nodeType="clickEffect">
                                   <p:stCondLst>
                                     <p:cond delay="0"/>
                                   </p:stCondLst>
                                   <p:childTnLst>
                                     <p:set>
                                       <p:cBhvr>
-                                        <p:cTn id="14" dur="1" fill="hold">
+                                        <p:cTn id="16" dur="1" fill="hold">
                                           <p:stCondLst>
                                             <p:cond delay="0"/>
                                           </p:stCondLst>
@@ -26085,6 +26288,7 @@
       </p:par>
     </p:tnLst>
     <p:bldLst>
+      <p:bldP spid="7" grpId="0" build="p"/>
       <p:bldP spid="26" grpId="0"/>
     </p:bldLst>
   </p:timing>
@@ -26167,7 +26371,15 @@
           <a:p>
             <a:r>
               <a:rPr lang="en-US" sz="2000" dirty="0" smtClean="0"/>
-              <a:t>While distribution system generally do not examine the no load condition, a measure between peak load and minimu</a:t>
+              <a:t>While distribution </a:t>
+            </a:r>
+            <a:r>
+              <a:rPr lang="en-US" sz="2000" dirty="0" smtClean="0"/>
+              <a:t>systems </a:t>
+            </a:r>
+            <a:r>
+              <a:rPr lang="en-US" sz="2000" dirty="0" smtClean="0"/>
+              <a:t>generally do not examine the no load condition, a measure between peak load and minimu</a:t>
             </a:r>
             <a:r>
               <a:rPr lang="en-US" sz="2000" dirty="0"/>
@@ -26224,7 +26436,7 @@
           <a:graphicData uri="http://schemas.openxmlformats.org/presentationml/2006/ole">
             <mc:AlternateContent xmlns:mc="http://schemas.openxmlformats.org/markup-compatibility/2006">
               <mc:Choice xmlns:v="urn:schemas-microsoft-com:vml" Requires="v">
-                <p:oleObj spid="_x0000_s17481" name="Equation" r:id="rId3" imgW="3149280" imgH="469800" progId="Equation.3">
+                <p:oleObj spid="_x0000_s17485" name="Equation" r:id="rId3" imgW="3149280" imgH="469800" progId="Equation.3">
                   <p:embed/>
                 </p:oleObj>
               </mc:Choice>
@@ -26579,7 +26791,7 @@
           <a:graphicData uri="http://schemas.openxmlformats.org/presentationml/2006/ole">
             <mc:AlternateContent xmlns:mc="http://schemas.openxmlformats.org/markup-compatibility/2006">
               <mc:Choice xmlns:v="urn:schemas-microsoft-com:vml" Requires="v">
-                <p:oleObj spid="_x0000_s18571" name="Equation" r:id="rId3" imgW="3377880" imgH="469800" progId="Equation.3">
+                <p:oleObj spid="_x0000_s18579" name="Equation" r:id="rId3" imgW="3377880" imgH="469800" progId="Equation.3">
                   <p:embed/>
                 </p:oleObj>
               </mc:Choice>
@@ -26643,7 +26855,7 @@
           <a:graphicData uri="http://schemas.openxmlformats.org/presentationml/2006/ole">
             <mc:AlternateContent xmlns:mc="http://schemas.openxmlformats.org/markup-compatibility/2006">
               <mc:Choice xmlns:v="urn:schemas-microsoft-com:vml" Requires="v">
-                <p:oleObj spid="_x0000_s18572" name="Equation" r:id="rId5" imgW="3377880" imgH="469800" progId="Equation.3">
+                <p:oleObj spid="_x0000_s18580" name="Equation" r:id="rId5" imgW="3377880" imgH="469800" progId="Equation.3">
                   <p:embed/>
                 </p:oleObj>
               </mc:Choice>
@@ -26902,33 +27114,15 @@
                                   </p:childTnLst>
                                 </p:cTn>
                               </p:par>
-                            </p:childTnLst>
-                          </p:cTn>
-                        </p:par>
-                      </p:childTnLst>
-                    </p:cTn>
-                  </p:par>
-                  <p:par>
-                    <p:cTn id="7" fill="hold">
-                      <p:stCondLst>
-                        <p:cond delay="indefinite"/>
-                      </p:stCondLst>
-                      <p:childTnLst>
-                        <p:par>
-                          <p:cTn id="8" fill="hold">
-                            <p:stCondLst>
-                              <p:cond delay="0"/>
-                            </p:stCondLst>
-                            <p:childTnLst>
                               <p:par>
-                                <p:cTn id="9" presetID="1" presetClass="entr" presetSubtype="0" fill="hold" nodeType="clickEffect">
+                                <p:cTn id="7" presetID="1" presetClass="entr" presetSubtype="0" fill="hold" nodeType="withEffect">
                                   <p:stCondLst>
                                     <p:cond delay="0"/>
                                   </p:stCondLst>
                                   <p:childTnLst>
                                     <p:set>
                                       <p:cBhvr>
-                                        <p:cTn id="10" dur="1" fill="hold">
+                                        <p:cTn id="8" dur="1" fill="hold">
                                           <p:stCondLst>
                                             <p:cond delay="0"/>
                                           </p:stCondLst>
@@ -26954,26 +27148,26 @@
                     </p:cTn>
                   </p:par>
                   <p:par>
-                    <p:cTn id="11" fill="hold">
+                    <p:cTn id="9" fill="hold">
                       <p:stCondLst>
                         <p:cond delay="indefinite"/>
                       </p:stCondLst>
                       <p:childTnLst>
                         <p:par>
-                          <p:cTn id="12" fill="hold">
+                          <p:cTn id="10" fill="hold">
                             <p:stCondLst>
                               <p:cond delay="0"/>
                             </p:stCondLst>
                             <p:childTnLst>
                               <p:par>
-                                <p:cTn id="13" presetID="1" presetClass="entr" presetSubtype="0" fill="hold" nodeType="clickEffect">
+                                <p:cTn id="11" presetID="1" presetClass="entr" presetSubtype="0" fill="hold" nodeType="clickEffect">
                                   <p:stCondLst>
                                     <p:cond delay="0"/>
                                   </p:stCondLst>
                                   <p:childTnLst>
                                     <p:set>
                                       <p:cBhvr>
-                                        <p:cTn id="14" dur="1" fill="hold">
+                                        <p:cTn id="12" dur="1" fill="hold">
                                           <p:stCondLst>
                                             <p:cond delay="0"/>
                                           </p:stCondLst>
@@ -26992,33 +27186,15 @@
                                   </p:childTnLst>
                                 </p:cTn>
                               </p:par>
-                            </p:childTnLst>
-                          </p:cTn>
-                        </p:par>
-                      </p:childTnLst>
-                    </p:cTn>
-                  </p:par>
-                  <p:par>
-                    <p:cTn id="15" fill="hold">
-                      <p:stCondLst>
-                        <p:cond delay="indefinite"/>
-                      </p:stCondLst>
-                      <p:childTnLst>
-                        <p:par>
-                          <p:cTn id="16" fill="hold">
-                            <p:stCondLst>
-                              <p:cond delay="0"/>
-                            </p:stCondLst>
-                            <p:childTnLst>
                               <p:par>
-                                <p:cTn id="17" presetID="1" presetClass="entr" presetSubtype="0" fill="hold" nodeType="clickEffect">
+                                <p:cTn id="13" presetID="1" presetClass="entr" presetSubtype="0" fill="hold" nodeType="withEffect">
                                   <p:stCondLst>
                                     <p:cond delay="0"/>
                                   </p:stCondLst>
                                   <p:childTnLst>
                                     <p:set>
                                       <p:cBhvr>
-                                        <p:cTn id="18" dur="1" fill="hold">
+                                        <p:cTn id="14" dur="1" fill="hold">
                                           <p:stCondLst>
                                             <p:cond delay="0"/>
                                           </p:stCondLst>
@@ -27238,7 +27414,7 @@
           <a:graphicData uri="http://schemas.openxmlformats.org/presentationml/2006/ole">
             <mc:AlternateContent xmlns:mc="http://schemas.openxmlformats.org/markup-compatibility/2006">
               <mc:Choice xmlns:v="urn:schemas-microsoft-com:vml" Requires="v">
-                <p:oleObj spid="_x0000_s19595" name="Equation" r:id="rId4" imgW="3377880" imgH="469800" progId="Equation.3">
+                <p:oleObj spid="_x0000_s19601" name="Equation" r:id="rId4" imgW="3377880" imgH="469800" progId="Equation.3">
                   <p:embed/>
                 </p:oleObj>
               </mc:Choice>
@@ -27327,7 +27503,7 @@
           <a:graphicData uri="http://schemas.openxmlformats.org/presentationml/2006/ole">
             <mc:AlternateContent xmlns:mc="http://schemas.openxmlformats.org/markup-compatibility/2006">
               <mc:Choice xmlns:v="urn:schemas-microsoft-com:vml" Requires="v">
-                <p:oleObj spid="_x0000_s19596" name="Equation" r:id="rId6" imgW="3187440" imgH="469800" progId="Equation.3">
+                <p:oleObj spid="_x0000_s19602" name="Equation" r:id="rId6" imgW="3187440" imgH="469800" progId="Equation.3">
                   <p:embed/>
                 </p:oleObj>
               </mc:Choice>

</xml_diff>

<commit_message>
Updated final version of slides, removed the homework and exam.
</commit_message>
<xml_diff>
--- a/University of Washington Class/Module 4 - Voltage control devices.pptx
+++ b/University of Washington Class/Module 4 - Voltage control devices.pptx
@@ -5,7 +5,7 @@
     <p:sldMasterId id="2147483648" r:id="rId1"/>
   </p:sldMasterIdLst>
   <p:notesMasterIdLst>
-    <p:notesMasterId r:id="rId72"/>
+    <p:notesMasterId r:id="rId73"/>
   </p:notesMasterIdLst>
   <p:sldIdLst>
     <p:sldId id="256" r:id="rId2"/>
@@ -77,7 +77,8 @@
     <p:sldId id="374" r:id="rId68"/>
     <p:sldId id="375" r:id="rId69"/>
     <p:sldId id="364" r:id="rId70"/>
-    <p:sldId id="370" r:id="rId71"/>
+    <p:sldId id="376" r:id="rId71"/>
+    <p:sldId id="370" r:id="rId72"/>
   </p:sldIdLst>
   <p:sldSz cx="9144000" cy="6858000" type="screen4x3"/>
   <p:notesSz cx="6858000" cy="9144000"/>
@@ -262,7 +263,7 @@
             <a:fld id="{30456DE2-1550-4DE2-8C7A-8D9992B45402}" type="datetimeFigureOut">
               <a:rPr lang="en-US" smtClean="0"/>
               <a:pPr/>
-              <a:t>1/3/2012</a:t>
+              <a:t>1/17/2012</a:t>
             </a:fld>
             <a:endParaRPr lang="en-US"/>
           </a:p>
@@ -714,7 +715,7 @@
           <a:p>
             <a:fld id="{F5373481-B42A-4D4F-86EA-A88290C58964}" type="datetime1">
               <a:rPr lang="en-US" smtClean="0"/>
-              <a:t>1/3/2012</a:t>
+              <a:t>1/17/2012</a:t>
             </a:fld>
             <a:endParaRPr lang="en-US"/>
           </a:p>
@@ -983,7 +984,7 @@
           <a:p>
             <a:fld id="{03F670FF-8926-4709-96F6-FC2958129ED2}" type="datetime1">
               <a:rPr lang="en-US" smtClean="0"/>
-              <a:t>1/3/2012</a:t>
+              <a:t>1/17/2012</a:t>
             </a:fld>
             <a:endParaRPr lang="en-US"/>
           </a:p>
@@ -1159,7 +1160,7 @@
           <a:p>
             <a:fld id="{1BF16CE4-EFFC-4BDF-B5A4-4A15C47E021B}" type="datetime1">
               <a:rPr lang="en-US" smtClean="0"/>
-              <a:t>1/3/2012</a:t>
+              <a:t>1/17/2012</a:t>
             </a:fld>
             <a:endParaRPr lang="en-US"/>
           </a:p>
@@ -1349,7 +1350,7 @@
           <a:p>
             <a:fld id="{D89124DC-29B6-4231-9D25-0C78D5EFDDC9}" type="datetime1">
               <a:rPr lang="en-US" smtClean="0"/>
-              <a:t>1/3/2012</a:t>
+              <a:t>1/17/2012</a:t>
             </a:fld>
             <a:endParaRPr lang="en-US" dirty="0"/>
           </a:p>
@@ -1598,7 +1599,7 @@
           <a:p>
             <a:fld id="{63DA24F3-3618-4EAF-A9E8-EEFE221E1493}" type="datetime1">
               <a:rPr lang="en-US" smtClean="0"/>
-              <a:t>1/3/2012</a:t>
+              <a:t>1/17/2012</a:t>
             </a:fld>
             <a:endParaRPr lang="en-US"/>
           </a:p>
@@ -1882,7 +1883,7 @@
           <a:p>
             <a:fld id="{69D8CDEA-265C-4EA9-A607-0D7D771780DB}" type="datetime1">
               <a:rPr lang="en-US" smtClean="0"/>
-              <a:t>1/3/2012</a:t>
+              <a:t>1/17/2012</a:t>
             </a:fld>
             <a:endParaRPr lang="en-US"/>
           </a:p>
@@ -2300,7 +2301,7 @@
           <a:p>
             <a:fld id="{ACFA6542-36F3-4A89-93B6-B9FED0856CDB}" type="datetime1">
               <a:rPr lang="en-US" smtClean="0"/>
-              <a:t>1/3/2012</a:t>
+              <a:t>1/17/2012</a:t>
             </a:fld>
             <a:endParaRPr lang="en-US"/>
           </a:p>
@@ -2414,7 +2415,7 @@
           <a:p>
             <a:fld id="{AE3B9829-009A-44FD-B649-E323418E7E5E}" type="datetime1">
               <a:rPr lang="en-US" smtClean="0"/>
-              <a:t>1/3/2012</a:t>
+              <a:t>1/17/2012</a:t>
             </a:fld>
             <a:endParaRPr lang="en-US"/>
           </a:p>
@@ -2505,7 +2506,7 @@
           <a:p>
             <a:fld id="{4391B5C5-7D92-4C37-8071-F3311CBE73D5}" type="datetime1">
               <a:rPr lang="en-US" smtClean="0"/>
-              <a:t>1/3/2012</a:t>
+              <a:t>1/17/2012</a:t>
             </a:fld>
             <a:endParaRPr lang="en-US"/>
           </a:p>
@@ -2778,7 +2779,7 @@
           <a:p>
             <a:fld id="{4689F7FE-6C86-4059-B972-0BBDA5F301D9}" type="datetime1">
               <a:rPr lang="en-US" smtClean="0"/>
-              <a:t>1/3/2012</a:t>
+              <a:t>1/17/2012</a:t>
             </a:fld>
             <a:endParaRPr lang="en-US"/>
           </a:p>
@@ -3027,7 +3028,7 @@
           <a:p>
             <a:fld id="{F09338A6-2CCC-46F1-9871-B278557BB635}" type="datetime1">
               <a:rPr lang="en-US" smtClean="0"/>
-              <a:t>1/3/2012</a:t>
+              <a:t>1/17/2012</a:t>
             </a:fld>
             <a:endParaRPr lang="en-US"/>
           </a:p>
@@ -3240,7 +3241,7 @@
           <a:p>
             <a:fld id="{14FE97D8-1050-4CA4-8B4F-E964B5B645D9}" type="datetime1">
               <a:rPr lang="en-US" smtClean="0"/>
-              <a:t>1/3/2012</a:t>
+              <a:t>1/17/2012</a:t>
             </a:fld>
             <a:endParaRPr lang="en-US" dirty="0"/>
           </a:p>
@@ -4815,7 +4816,7 @@
           <a:graphicData uri="http://schemas.openxmlformats.org/presentationml/2006/ole">
             <mc:AlternateContent xmlns:mc="http://schemas.openxmlformats.org/markup-compatibility/2006">
               <mc:Choice xmlns:v="urn:schemas-microsoft-com:vml" Requires="v">
-                <p:oleObj spid="_x0000_s20710" name="Equation" r:id="rId7" imgW="1739880" imgH="228600" progId="Equation.3">
+                <p:oleObj spid="_x0000_s20713" name="Equation" r:id="rId7" imgW="1739880" imgH="228600" progId="Equation.3">
                   <p:embed/>
                 </p:oleObj>
               </mc:Choice>
@@ -4879,7 +4880,7 @@
           <a:graphicData uri="http://schemas.openxmlformats.org/presentationml/2006/ole">
             <mc:AlternateContent xmlns:mc="http://schemas.openxmlformats.org/markup-compatibility/2006">
               <mc:Choice xmlns:v="urn:schemas-microsoft-com:vml" Requires="v">
-                <p:oleObj spid="_x0000_s20711" name="Equation" r:id="rId9" imgW="2120760" imgH="228600" progId="Equation.3">
+                <p:oleObj spid="_x0000_s20714" name="Equation" r:id="rId9" imgW="2120760" imgH="228600" progId="Equation.3">
                   <p:embed/>
                 </p:oleObj>
               </mc:Choice>
@@ -4943,7 +4944,7 @@
           <a:graphicData uri="http://schemas.openxmlformats.org/presentationml/2006/ole">
             <mc:AlternateContent xmlns:mc="http://schemas.openxmlformats.org/markup-compatibility/2006">
               <mc:Choice xmlns:v="urn:schemas-microsoft-com:vml" Requires="v">
-                <p:oleObj spid="_x0000_s20712" name="Equation" r:id="rId11" imgW="2120760" imgH="279360" progId="Equation.3">
+                <p:oleObj spid="_x0000_s20715" name="Equation" r:id="rId11" imgW="2120760" imgH="279360" progId="Equation.3">
                   <p:embed/>
                 </p:oleObj>
               </mc:Choice>
@@ -6006,7 +6007,7 @@
           <a:graphicData uri="http://schemas.openxmlformats.org/presentationml/2006/ole">
             <mc:AlternateContent xmlns:mc="http://schemas.openxmlformats.org/markup-compatibility/2006">
               <mc:Choice xmlns:v="urn:schemas-microsoft-com:vml" Requires="v">
-                <p:oleObj spid="_x0000_s24651" name="Equation" r:id="rId3" imgW="850680" imgH="431640" progId="Equation.3">
+                <p:oleObj spid="_x0000_s24652" name="Equation" r:id="rId3" imgW="850680" imgH="431640" progId="Equation.3">
                   <p:embed/>
                 </p:oleObj>
               </mc:Choice>
@@ -6332,7 +6333,7 @@
           <a:graphicData uri="http://schemas.openxmlformats.org/presentationml/2006/ole">
             <mc:AlternateContent xmlns:mc="http://schemas.openxmlformats.org/markup-compatibility/2006">
               <mc:Choice xmlns:v="urn:schemas-microsoft-com:vml" Requires="v">
-                <p:oleObj spid="_x0000_s25735" name="Equation" r:id="rId3" imgW="850680" imgH="431640" progId="Equation.3">
+                <p:oleObj spid="_x0000_s25737" name="Equation" r:id="rId3" imgW="850680" imgH="431640" progId="Equation.3">
                   <p:embed/>
                 </p:oleObj>
               </mc:Choice>
@@ -6421,7 +6422,7 @@
           <a:graphicData uri="http://schemas.openxmlformats.org/presentationml/2006/ole">
             <mc:AlternateContent xmlns:mc="http://schemas.openxmlformats.org/markup-compatibility/2006">
               <mc:Choice xmlns:v="urn:schemas-microsoft-com:vml" Requires="v">
-                <p:oleObj spid="_x0000_s25736" name="Equation" r:id="rId5" imgW="850680" imgH="431640" progId="Equation.3">
+                <p:oleObj spid="_x0000_s25738" name="Equation" r:id="rId5" imgW="850680" imgH="431640" progId="Equation.3">
                   <p:embed/>
                 </p:oleObj>
               </mc:Choice>
@@ -7060,7 +7061,7 @@
           <a:graphicData uri="http://schemas.openxmlformats.org/presentationml/2006/ole">
             <mc:AlternateContent xmlns:mc="http://schemas.openxmlformats.org/markup-compatibility/2006">
               <mc:Choice xmlns:v="urn:schemas-microsoft-com:vml" Requires="v">
-                <p:oleObj spid="_x0000_s21681" name="Equation" r:id="rId3" imgW="850680" imgH="431640" progId="Equation.3">
+                <p:oleObj spid="_x0000_s21683" name="Equation" r:id="rId3" imgW="850680" imgH="431640" progId="Equation.3">
                   <p:embed/>
                 </p:oleObj>
               </mc:Choice>
@@ -7124,7 +7125,7 @@
           <a:graphicData uri="http://schemas.openxmlformats.org/presentationml/2006/ole">
             <mc:AlternateContent xmlns:mc="http://schemas.openxmlformats.org/markup-compatibility/2006">
               <mc:Choice xmlns:v="urn:schemas-microsoft-com:vml" Requires="v">
-                <p:oleObj spid="_x0000_s21682" name="Equation" r:id="rId5" imgW="1193760" imgH="431640" progId="Equation.3">
+                <p:oleObj spid="_x0000_s21684" name="Equation" r:id="rId5" imgW="1193760" imgH="431640" progId="Equation.3">
                   <p:embed/>
                 </p:oleObj>
               </mc:Choice>
@@ -10292,15 +10293,7 @@
           <a:p>
             <a:r>
               <a:rPr lang="en-US" dirty="0" smtClean="0"/>
-              <a:t>Traditional transmission level powerflow analysis assumes that all </a:t>
-            </a:r>
-            <a:r>
-              <a:rPr lang="en-US" dirty="0" smtClean="0"/>
-              <a:t>loads </a:t>
-            </a:r>
-            <a:r>
-              <a:rPr lang="en-US" dirty="0" smtClean="0"/>
-              <a:t>are constant power, for both real (P) and reactive (Q).  As a result, power and energy consumption are independent of line voltage.</a:t>
+              <a:t>Traditional transmission level powerflow analysis assumes that all loads are constant power, for both real (P) and reactive (Q).  As a result, power and energy consumption are independent of line voltage.</a:t>
             </a:r>
           </a:p>
           <a:p>
@@ -11208,7 +11201,7 @@
           <a:graphicData uri="http://schemas.openxmlformats.org/presentationml/2006/ole">
             <mc:AlternateContent xmlns:mc="http://schemas.openxmlformats.org/markup-compatibility/2006">
               <mc:Choice xmlns:v="urn:schemas-microsoft-com:vml" Requires="v">
-                <p:oleObj spid="_x0000_s2389" name="Equation" r:id="rId3" imgW="4203360" imgH="558720" progId="Equation.3">
+                <p:oleObj spid="_x0000_s2392" name="Equation" r:id="rId3" imgW="4203360" imgH="558720" progId="Equation.3">
                   <p:embed/>
                 </p:oleObj>
               </mc:Choice>
@@ -11276,7 +11269,7 @@
           <a:graphicData uri="http://schemas.openxmlformats.org/presentationml/2006/ole">
             <mc:AlternateContent xmlns:mc="http://schemas.openxmlformats.org/markup-compatibility/2006">
               <mc:Choice xmlns:v="urn:schemas-microsoft-com:vml" Requires="v">
-                <p:oleObj spid="_x0000_s2390" name="Equation" r:id="rId5" imgW="4165560" imgH="558720" progId="Equation.3">
+                <p:oleObj spid="_x0000_s2393" name="Equation" r:id="rId5" imgW="4165560" imgH="558720" progId="Equation.3">
                   <p:embed/>
                 </p:oleObj>
               </mc:Choice>
@@ -11344,7 +11337,7 @@
           <a:graphicData uri="http://schemas.openxmlformats.org/presentationml/2006/ole">
             <mc:AlternateContent xmlns:mc="http://schemas.openxmlformats.org/markup-compatibility/2006">
               <mc:Choice xmlns:v="urn:schemas-microsoft-com:vml" Requires="v">
-                <p:oleObj spid="_x0000_s2391" name="Equation" r:id="rId7" imgW="1015920" imgH="228600" progId="Equation.3">
+                <p:oleObj spid="_x0000_s2394" name="Equation" r:id="rId7" imgW="1015920" imgH="228600" progId="Equation.3">
                   <p:embed/>
                 </p:oleObj>
               </mc:Choice>
@@ -12505,7 +12498,7 @@
           <a:graphicData uri="http://schemas.openxmlformats.org/presentationml/2006/ole">
             <mc:AlternateContent xmlns:mc="http://schemas.openxmlformats.org/markup-compatibility/2006">
               <mc:Choice xmlns:v="urn:schemas-microsoft-com:vml" Requires="v">
-                <p:oleObj spid="_x0000_s16573" name="Equation" r:id="rId3" imgW="4965480" imgH="558720" progId="Equation.3">
+                <p:oleObj spid="_x0000_s16575" name="Equation" r:id="rId3" imgW="4965480" imgH="558720" progId="Equation.3">
                   <p:embed/>
                 </p:oleObj>
               </mc:Choice>
@@ -12575,7 +12568,7 @@
           <a:graphicData uri="http://schemas.openxmlformats.org/presentationml/2006/ole">
             <mc:AlternateContent xmlns:mc="http://schemas.openxmlformats.org/markup-compatibility/2006">
               <mc:Choice xmlns:v="urn:schemas-microsoft-com:vml" Requires="v">
-                <p:oleObj spid="_x0000_s16574" name="Equation" r:id="rId5" imgW="4927320" imgH="558720" progId="Equation.3">
+                <p:oleObj spid="_x0000_s16576" name="Equation" r:id="rId5" imgW="4927320" imgH="558720" progId="Equation.3">
                   <p:embed/>
                 </p:oleObj>
               </mc:Choice>
@@ -14917,7 +14910,7 @@
           <a:graphicData uri="http://schemas.openxmlformats.org/presentationml/2006/ole">
             <mc:AlternateContent xmlns:mc="http://schemas.openxmlformats.org/markup-compatibility/2006">
               <mc:Choice xmlns:v="urn:schemas-microsoft-com:vml" Requires="v">
-                <p:oleObj spid="_x0000_s27712" name="Equation" r:id="rId3" imgW="114120" imgH="215640" progId="Equation.3">
+                <p:oleObj spid="_x0000_s27713" name="Equation" r:id="rId3" imgW="114120" imgH="215640" progId="Equation.3">
                   <p:embed/>
                 </p:oleObj>
               </mc:Choice>
@@ -15077,7 +15070,7 @@
           <a:graphicData uri="http://schemas.openxmlformats.org/presentationml/2006/ole">
             <mc:AlternateContent xmlns:mc="http://schemas.openxmlformats.org/markup-compatibility/2006">
               <mc:Choice xmlns:v="urn:schemas-microsoft-com:vml" Requires="v">
-                <p:oleObj spid="_x0000_s11080" name="Equation" r:id="rId3" imgW="114120" imgH="215640" progId="Equation.3">
+                <p:oleObj spid="_x0000_s11088" name="Equation" r:id="rId3" imgW="114120" imgH="215640" progId="Equation.3">
                   <p:embed/>
                 </p:oleObj>
               </mc:Choice>
@@ -15147,7 +15140,7 @@
           <a:graphicData uri="http://schemas.openxmlformats.org/presentationml/2006/ole">
             <mc:AlternateContent xmlns:mc="http://schemas.openxmlformats.org/markup-compatibility/2006">
               <mc:Choice xmlns:v="urn:schemas-microsoft-com:vml" Requires="v">
-                <p:oleObj spid="_x0000_s11081" name="Equation" r:id="rId5" imgW="4076640" imgH="558720" progId="Equation.3">
+                <p:oleObj spid="_x0000_s11089" name="Equation" r:id="rId5" imgW="4076640" imgH="558720" progId="Equation.3">
                   <p:embed/>
                 </p:oleObj>
               </mc:Choice>
@@ -15217,7 +15210,7 @@
           <a:graphicData uri="http://schemas.openxmlformats.org/presentationml/2006/ole">
             <mc:AlternateContent xmlns:mc="http://schemas.openxmlformats.org/markup-compatibility/2006">
               <mc:Choice xmlns:v="urn:schemas-microsoft-com:vml" Requires="v">
-                <p:oleObj spid="_x0000_s11082" name="Equation" r:id="rId7" imgW="4038480" imgH="558720" progId="Equation.3">
+                <p:oleObj spid="_x0000_s11090" name="Equation" r:id="rId7" imgW="4038480" imgH="558720" progId="Equation.3">
                   <p:embed/>
                 </p:oleObj>
               </mc:Choice>
@@ -15293,7 +15286,7 @@
           <a:graphicData uri="http://schemas.openxmlformats.org/presentationml/2006/ole">
             <mc:AlternateContent xmlns:mc="http://schemas.openxmlformats.org/markup-compatibility/2006">
               <mc:Choice xmlns:v="urn:schemas-microsoft-com:vml" Requires="v">
-                <p:oleObj spid="_x0000_s11083" name="Equation" r:id="rId9" imgW="1777680" imgH="241200" progId="Equation.3">
+                <p:oleObj spid="_x0000_s11091" name="Equation" r:id="rId9" imgW="1777680" imgH="241200" progId="Equation.3">
                   <p:embed/>
                 </p:oleObj>
               </mc:Choice>
@@ -15363,7 +15356,7 @@
           <a:graphicData uri="http://schemas.openxmlformats.org/presentationml/2006/ole">
             <mc:AlternateContent xmlns:mc="http://schemas.openxmlformats.org/markup-compatibility/2006">
               <mc:Choice xmlns:v="urn:schemas-microsoft-com:vml" Requires="v">
-                <p:oleObj spid="_x0000_s11084" name="Equation" r:id="rId11" imgW="977760" imgH="228600" progId="Equation.3">
+                <p:oleObj spid="_x0000_s11092" name="Equation" r:id="rId11" imgW="977760" imgH="228600" progId="Equation.3">
                   <p:embed/>
                 </p:oleObj>
               </mc:Choice>
@@ -15433,7 +15426,7 @@
           <a:graphicData uri="http://schemas.openxmlformats.org/presentationml/2006/ole">
             <mc:AlternateContent xmlns:mc="http://schemas.openxmlformats.org/markup-compatibility/2006">
               <mc:Choice xmlns:v="urn:schemas-microsoft-com:vml" Requires="v">
-                <p:oleObj spid="_x0000_s11085" name="Equation" r:id="rId13" imgW="1536480" imgH="482400" progId="Equation.3">
+                <p:oleObj spid="_x0000_s11093" name="Equation" r:id="rId13" imgW="1536480" imgH="482400" progId="Equation.3">
                   <p:embed/>
                 </p:oleObj>
               </mc:Choice>
@@ -15503,7 +15496,7 @@
           <a:graphicData uri="http://schemas.openxmlformats.org/presentationml/2006/ole">
             <mc:AlternateContent xmlns:mc="http://schemas.openxmlformats.org/markup-compatibility/2006">
               <mc:Choice xmlns:v="urn:schemas-microsoft-com:vml" Requires="v">
-                <p:oleObj spid="_x0000_s11086" name="Equation" r:id="rId15" imgW="2145960" imgH="431640" progId="Equation.3">
+                <p:oleObj spid="_x0000_s11094" name="Equation" r:id="rId15" imgW="2145960" imgH="431640" progId="Equation.3">
                   <p:embed/>
                 </p:oleObj>
               </mc:Choice>
@@ -15573,7 +15566,7 @@
           <a:graphicData uri="http://schemas.openxmlformats.org/presentationml/2006/ole">
             <mc:AlternateContent xmlns:mc="http://schemas.openxmlformats.org/markup-compatibility/2006">
               <mc:Choice xmlns:v="urn:schemas-microsoft-com:vml" Requires="v">
-                <p:oleObj spid="_x0000_s11087" name="Equation" r:id="rId17" imgW="1612800" imgH="228600" progId="Equation.3">
+                <p:oleObj spid="_x0000_s11095" name="Equation" r:id="rId17" imgW="1612800" imgH="228600" progId="Equation.3">
                   <p:embed/>
                 </p:oleObj>
               </mc:Choice>
@@ -16467,7 +16460,7 @@
           <a:graphicData uri="http://schemas.openxmlformats.org/presentationml/2006/ole">
             <mc:AlternateContent xmlns:mc="http://schemas.openxmlformats.org/markup-compatibility/2006">
               <mc:Choice xmlns:v="urn:schemas-microsoft-com:vml" Requires="v">
-                <p:oleObj spid="_x0000_s28930" name="Equation" r:id="rId3" imgW="114120" imgH="215640" progId="Equation.3">
+                <p:oleObj spid="_x0000_s28934" name="Equation" r:id="rId3" imgW="114120" imgH="215640" progId="Equation.3">
                   <p:embed/>
                 </p:oleObj>
               </mc:Choice>
@@ -16543,7 +16536,7 @@
           <a:graphicData uri="http://schemas.openxmlformats.org/presentationml/2006/ole">
             <mc:AlternateContent xmlns:mc="http://schemas.openxmlformats.org/markup-compatibility/2006">
               <mc:Choice xmlns:v="urn:schemas-microsoft-com:vml" Requires="v">
-                <p:oleObj spid="_x0000_s28931" name="Equation" r:id="rId5" imgW="10756800" imgH="1143000" progId="Equation.3">
+                <p:oleObj spid="_x0000_s28935" name="Equation" r:id="rId5" imgW="10756800" imgH="1143000" progId="Equation.3">
                   <p:embed/>
                 </p:oleObj>
               </mc:Choice>
@@ -16605,7 +16598,7 @@
           <a:graphicData uri="http://schemas.openxmlformats.org/presentationml/2006/ole">
             <mc:AlternateContent xmlns:mc="http://schemas.openxmlformats.org/markup-compatibility/2006">
               <mc:Choice xmlns:v="urn:schemas-microsoft-com:vml" Requires="v">
-                <p:oleObj spid="_x0000_s28932" name="Equation" r:id="rId7" imgW="2145960" imgH="431640" progId="Equation.3">
+                <p:oleObj spid="_x0000_s28936" name="Equation" r:id="rId7" imgW="2145960" imgH="431640" progId="Equation.3">
                   <p:embed/>
                 </p:oleObj>
               </mc:Choice>
@@ -16694,7 +16687,7 @@
           <a:graphicData uri="http://schemas.openxmlformats.org/presentationml/2006/ole">
             <mc:AlternateContent xmlns:mc="http://schemas.openxmlformats.org/markup-compatibility/2006">
               <mc:Choice xmlns:v="urn:schemas-microsoft-com:vml" Requires="v">
-                <p:oleObj spid="_x0000_s28933" name="Equation" r:id="rId9" imgW="10553400" imgH="1143000" progId="Equation.3">
+                <p:oleObj spid="_x0000_s28937" name="Equation" r:id="rId9" imgW="10553400" imgH="1143000" progId="Equation.3">
                   <p:embed/>
                 </p:oleObj>
               </mc:Choice>
@@ -17209,7 +17202,7 @@
           <a:graphicData uri="http://schemas.openxmlformats.org/presentationml/2006/ole">
             <mc:AlternateContent xmlns:mc="http://schemas.openxmlformats.org/markup-compatibility/2006">
               <mc:Choice xmlns:v="urn:schemas-microsoft-com:vml" Requires="v">
-                <p:oleObj spid="_x0000_s11985" name="Equation" r:id="rId3" imgW="114120" imgH="215640" progId="Equation.3">
+                <p:oleObj spid="_x0000_s11992" name="Equation" r:id="rId3" imgW="114120" imgH="215640" progId="Equation.3">
                   <p:embed/>
                 </p:oleObj>
               </mc:Choice>
@@ -17279,7 +17272,7 @@
           <a:graphicData uri="http://schemas.openxmlformats.org/presentationml/2006/ole">
             <mc:AlternateContent xmlns:mc="http://schemas.openxmlformats.org/markup-compatibility/2006">
               <mc:Choice xmlns:v="urn:schemas-microsoft-com:vml" Requires="v">
-                <p:oleObj spid="_x0000_s11986" name="Equation" r:id="rId5" imgW="1803240" imgH="482400" progId="Equation.3">
+                <p:oleObj spid="_x0000_s11993" name="Equation" r:id="rId5" imgW="1803240" imgH="482400" progId="Equation.3">
                   <p:embed/>
                 </p:oleObj>
               </mc:Choice>
@@ -17349,7 +17342,7 @@
           <a:graphicData uri="http://schemas.openxmlformats.org/presentationml/2006/ole">
             <mc:AlternateContent xmlns:mc="http://schemas.openxmlformats.org/markup-compatibility/2006">
               <mc:Choice xmlns:v="urn:schemas-microsoft-com:vml" Requires="v">
-                <p:oleObj spid="_x0000_s11987" name="Equation" r:id="rId7" imgW="1790640" imgH="266400" progId="Equation.3">
+                <p:oleObj spid="_x0000_s11994" name="Equation" r:id="rId7" imgW="1790640" imgH="266400" progId="Equation.3">
                   <p:embed/>
                 </p:oleObj>
               </mc:Choice>
@@ -17425,7 +17418,7 @@
           <a:graphicData uri="http://schemas.openxmlformats.org/presentationml/2006/ole">
             <mc:AlternateContent xmlns:mc="http://schemas.openxmlformats.org/markup-compatibility/2006">
               <mc:Choice xmlns:v="urn:schemas-microsoft-com:vml" Requires="v">
-                <p:oleObj spid="_x0000_s11988" name="Equation" r:id="rId9" imgW="2145960" imgH="431640" progId="Equation.3">
+                <p:oleObj spid="_x0000_s11995" name="Equation" r:id="rId9" imgW="2145960" imgH="431640" progId="Equation.3">
                   <p:embed/>
                 </p:oleObj>
               </mc:Choice>
@@ -17489,7 +17482,7 @@
           <a:graphicData uri="http://schemas.openxmlformats.org/presentationml/2006/ole">
             <mc:AlternateContent xmlns:mc="http://schemas.openxmlformats.org/markup-compatibility/2006">
               <mc:Choice xmlns:v="urn:schemas-microsoft-com:vml" Requires="v">
-                <p:oleObj spid="_x0000_s11989" name="Equation" r:id="rId11" imgW="2450880" imgH="228600" progId="Equation.3">
+                <p:oleObj spid="_x0000_s11996" name="Equation" r:id="rId11" imgW="2450880" imgH="228600" progId="Equation.3">
                   <p:embed/>
                 </p:oleObj>
               </mc:Choice>
@@ -17559,7 +17552,7 @@
           <a:graphicData uri="http://schemas.openxmlformats.org/presentationml/2006/ole">
             <mc:AlternateContent xmlns:mc="http://schemas.openxmlformats.org/markup-compatibility/2006">
               <mc:Choice xmlns:v="urn:schemas-microsoft-com:vml" Requires="v">
-                <p:oleObj spid="_x0000_s11990" name="Equation" r:id="rId13" imgW="634680" imgH="215640" progId="Equation.3">
+                <p:oleObj spid="_x0000_s11997" name="Equation" r:id="rId13" imgW="634680" imgH="215640" progId="Equation.3">
                   <p:embed/>
                 </p:oleObj>
               </mc:Choice>
@@ -17689,7 +17682,7 @@
           <a:graphicData uri="http://schemas.openxmlformats.org/presentationml/2006/ole">
             <mc:AlternateContent xmlns:mc="http://schemas.openxmlformats.org/markup-compatibility/2006">
               <mc:Choice xmlns:v="urn:schemas-microsoft-com:vml" Requires="v">
-                <p:oleObj spid="_x0000_s11991" name="Equation" r:id="rId15" imgW="1333440" imgH="1218960" progId="Equation.3">
+                <p:oleObj spid="_x0000_s11998" name="Equation" r:id="rId15" imgW="1333440" imgH="1218960" progId="Equation.3">
                   <p:embed/>
                 </p:oleObj>
               </mc:Choice>
@@ -18424,7 +18417,7 @@
           <a:graphicData uri="http://schemas.openxmlformats.org/presentationml/2006/ole">
             <mc:AlternateContent xmlns:mc="http://schemas.openxmlformats.org/markup-compatibility/2006">
               <mc:Choice xmlns:v="urn:schemas-microsoft-com:vml" Requires="v">
-                <p:oleObj spid="_x0000_s12585" name="Equation" r:id="rId3" imgW="114120" imgH="215640" progId="Equation.3">
+                <p:oleObj spid="_x0000_s12587" name="Equation" r:id="rId3" imgW="114120" imgH="215640" progId="Equation.3">
                   <p:embed/>
                 </p:oleObj>
               </mc:Choice>
@@ -18500,7 +18493,7 @@
           <a:graphicData uri="http://schemas.openxmlformats.org/presentationml/2006/ole">
             <mc:AlternateContent xmlns:mc="http://schemas.openxmlformats.org/markup-compatibility/2006">
               <mc:Choice xmlns:v="urn:schemas-microsoft-com:vml" Requires="v">
-                <p:oleObj spid="_x0000_s12586" name="Equation" r:id="rId5" imgW="1015920" imgH="1612800" progId="Equation.3">
+                <p:oleObj spid="_x0000_s12588" name="Equation" r:id="rId5" imgW="1015920" imgH="1612800" progId="Equation.3">
                   <p:embed/>
                 </p:oleObj>
               </mc:Choice>
@@ -18975,7 +18968,7 @@
           <a:graphicData uri="http://schemas.openxmlformats.org/presentationml/2006/ole">
             <mc:AlternateContent xmlns:mc="http://schemas.openxmlformats.org/markup-compatibility/2006">
               <mc:Choice xmlns:v="urn:schemas-microsoft-com:vml" Requires="v">
-                <p:oleObj spid="_x0000_s30812" name="Equation" r:id="rId3" imgW="5333760" imgH="558720" progId="Equation.3">
+                <p:oleObj spid="_x0000_s30814" name="Equation" r:id="rId3" imgW="5333760" imgH="558720" progId="Equation.3">
                   <p:embed/>
                 </p:oleObj>
               </mc:Choice>
@@ -19039,7 +19032,7 @@
           <a:graphicData uri="http://schemas.openxmlformats.org/presentationml/2006/ole">
             <mc:AlternateContent xmlns:mc="http://schemas.openxmlformats.org/markup-compatibility/2006">
               <mc:Choice xmlns:v="urn:schemas-microsoft-com:vml" Requires="v">
-                <p:oleObj spid="_x0000_s30813" name="Equation" r:id="rId5" imgW="5295600" imgH="558720" progId="Equation.3">
+                <p:oleObj spid="_x0000_s30815" name="Equation" r:id="rId5" imgW="5295600" imgH="558720" progId="Equation.3">
                   <p:embed/>
                 </p:oleObj>
               </mc:Choice>
@@ -19723,7 +19716,7 @@
           <a:graphicData uri="http://schemas.openxmlformats.org/presentationml/2006/ole">
             <mc:AlternateContent xmlns:mc="http://schemas.openxmlformats.org/markup-compatibility/2006">
               <mc:Choice xmlns:v="urn:schemas-microsoft-com:vml" Requires="v">
-                <p:oleObj spid="_x0000_s29757" name="Equation" r:id="rId3" imgW="1942920" imgH="761760" progId="Equation.3">
+                <p:oleObj spid="_x0000_s29758" name="Equation" r:id="rId3" imgW="1942920" imgH="761760" progId="Equation.3">
                   <p:embed/>
                 </p:oleObj>
               </mc:Choice>
@@ -20980,7 +20973,7 @@
           <a:graphicData uri="http://schemas.openxmlformats.org/presentationml/2006/ole">
             <mc:AlternateContent xmlns:mc="http://schemas.openxmlformats.org/markup-compatibility/2006">
               <mc:Choice xmlns:v="urn:schemas-microsoft-com:vml" Requires="v">
-                <p:oleObj spid="_x0000_s3276" name="Equation" r:id="rId4" imgW="3759120" imgH="431640" progId="Equation.3">
+                <p:oleObj spid="_x0000_s3278" name="Equation" r:id="rId4" imgW="3759120" imgH="431640" progId="Equation.3">
                   <p:embed/>
                 </p:oleObj>
               </mc:Choice>
@@ -21048,7 +21041,7 @@
           <a:graphicData uri="http://schemas.openxmlformats.org/presentationml/2006/ole">
             <mc:AlternateContent xmlns:mc="http://schemas.openxmlformats.org/markup-compatibility/2006">
               <mc:Choice xmlns:v="urn:schemas-microsoft-com:vml" Requires="v">
-                <p:oleObj spid="_x0000_s3277" name="Equation" r:id="rId6" imgW="2489040" imgH="431640" progId="Equation.3">
+                <p:oleObj spid="_x0000_s3279" name="Equation" r:id="rId6" imgW="2489040" imgH="431640" progId="Equation.3">
                   <p:embed/>
                 </p:oleObj>
               </mc:Choice>
@@ -21726,7 +21719,7 @@
           <a:graphicData uri="http://schemas.openxmlformats.org/presentationml/2006/ole">
             <mc:AlternateContent xmlns:mc="http://schemas.openxmlformats.org/markup-compatibility/2006">
               <mc:Choice xmlns:v="urn:schemas-microsoft-com:vml" Requires="v">
-                <p:oleObj spid="_x0000_s4202" r:id="rId3" imgW="3235112" imgH="3234987" progId="Msxml2.SAXXMLReader.5.0">
+                <p:oleObj spid="_x0000_s4203" r:id="rId3" imgW="3235112" imgH="3234987" progId="Msxml2.SAXXMLReader.5.0">
                   <p:embed/>
                 </p:oleObj>
               </mc:Choice>
@@ -22872,15 +22865,7 @@
             </a:r>
             <a:r>
               <a:rPr lang="en-US" sz="1600" dirty="0" smtClean="0"/>
-              <a:t> capacitor </a:t>
-            </a:r>
-            <a:r>
-              <a:rPr lang="en-US" sz="1600" dirty="0" smtClean="0"/>
-              <a:t>has </a:t>
-            </a:r>
-            <a:r>
-              <a:rPr lang="en-US" sz="1600" dirty="0" smtClean="0"/>
-              <a:t>been added at node 675.</a:t>
+              <a:t> capacitor has been added at node 675.</a:t>
             </a:r>
           </a:p>
           <a:p>
@@ -23252,7 +23237,7 @@
           <a:graphicData uri="http://schemas.openxmlformats.org/presentationml/2006/ole">
             <mc:AlternateContent xmlns:mc="http://schemas.openxmlformats.org/markup-compatibility/2006">
               <mc:Choice xmlns:v="urn:schemas-microsoft-com:vml" Requires="v">
-                <p:oleObj spid="_x0000_s38942" name="Equation" r:id="rId5" imgW="3073320" imgH="1447560" progId="Equation.3">
+                <p:oleObj spid="_x0000_s38944" name="Equation" r:id="rId5" imgW="3073320" imgH="1447560" progId="Equation.3">
                   <p:embed/>
                 </p:oleObj>
               </mc:Choice>
@@ -23335,7 +23320,7 @@
           <a:graphicData uri="http://schemas.openxmlformats.org/presentationml/2006/ole">
             <mc:AlternateContent xmlns:mc="http://schemas.openxmlformats.org/markup-compatibility/2006">
               <mc:Choice xmlns:v="urn:schemas-microsoft-com:vml" Requires="v">
-                <p:oleObj spid="_x0000_s38943" name="Equation" r:id="rId7" imgW="3073320" imgH="1447560" progId="Equation.3">
+                <p:oleObj spid="_x0000_s38945" name="Equation" r:id="rId7" imgW="3073320" imgH="1447560" progId="Equation.3">
                   <p:embed/>
                 </p:oleObj>
               </mc:Choice>
@@ -24184,7 +24169,7 @@
           <a:graphicData uri="http://schemas.openxmlformats.org/presentationml/2006/ole">
             <mc:AlternateContent xmlns:mc="http://schemas.openxmlformats.org/markup-compatibility/2006">
               <mc:Choice xmlns:v="urn:schemas-microsoft-com:vml" Requires="v">
-                <p:oleObj spid="_x0000_s39964" name="Equation" r:id="rId5" imgW="3073320" imgH="1447560" progId="Equation.3">
+                <p:oleObj spid="_x0000_s39966" name="Equation" r:id="rId5" imgW="3073320" imgH="1447560" progId="Equation.3">
                   <p:embed/>
                 </p:oleObj>
               </mc:Choice>
@@ -24267,7 +24252,7 @@
           <a:graphicData uri="http://schemas.openxmlformats.org/presentationml/2006/ole">
             <mc:AlternateContent xmlns:mc="http://schemas.openxmlformats.org/markup-compatibility/2006">
               <mc:Choice xmlns:v="urn:schemas-microsoft-com:vml" Requires="v">
-                <p:oleObj spid="_x0000_s39965" name="Equation" r:id="rId7" imgW="3085920" imgH="1447560" progId="Equation.3">
+                <p:oleObj spid="_x0000_s39967" name="Equation" r:id="rId7" imgW="3085920" imgH="1447560" progId="Equation.3">
                   <p:embed/>
                 </p:oleObj>
               </mc:Choice>
@@ -24756,7 +24741,7 @@
           <a:graphicData uri="http://schemas.openxmlformats.org/presentationml/2006/ole">
             <mc:AlternateContent xmlns:mc="http://schemas.openxmlformats.org/markup-compatibility/2006">
               <mc:Choice xmlns:v="urn:schemas-microsoft-com:vml" Requires="v">
-                <p:oleObj spid="_x0000_s40988" name="Equation" r:id="rId4" imgW="3073320" imgH="1447560" progId="Equation.3">
+                <p:oleObj spid="_x0000_s40990" name="Equation" r:id="rId4" imgW="3073320" imgH="1447560" progId="Equation.3">
                   <p:embed/>
                 </p:oleObj>
               </mc:Choice>
@@ -25014,7 +24999,7 @@
           <a:graphicData uri="http://schemas.openxmlformats.org/presentationml/2006/ole">
             <mc:AlternateContent xmlns:mc="http://schemas.openxmlformats.org/markup-compatibility/2006">
               <mc:Choice xmlns:v="urn:schemas-microsoft-com:vml" Requires="v">
-                <p:oleObj spid="_x0000_s40989" name="Equation" r:id="rId9" imgW="3073320" imgH="1447560" progId="Equation.3">
+                <p:oleObj spid="_x0000_s40991" name="Equation" r:id="rId9" imgW="3073320" imgH="1447560" progId="Equation.3">
                   <p:embed/>
                 </p:oleObj>
               </mc:Choice>
@@ -25469,7 +25454,7 @@
           <a:graphicData uri="http://schemas.openxmlformats.org/presentationml/2006/ole">
             <mc:AlternateContent xmlns:mc="http://schemas.openxmlformats.org/markup-compatibility/2006">
               <mc:Choice xmlns:v="urn:schemas-microsoft-com:vml" Requires="v">
-                <p:oleObj spid="_x0000_s32911" name="Equation" r:id="rId3" imgW="3301920" imgH="228600" progId="Equation.3">
+                <p:oleObj spid="_x0000_s32913" name="Equation" r:id="rId3" imgW="3301920" imgH="228600" progId="Equation.3">
                   <p:embed/>
                 </p:oleObj>
               </mc:Choice>
@@ -25533,7 +25518,7 @@
           <a:graphicData uri="http://schemas.openxmlformats.org/presentationml/2006/ole">
             <mc:AlternateContent xmlns:mc="http://schemas.openxmlformats.org/markup-compatibility/2006">
               <mc:Choice xmlns:v="urn:schemas-microsoft-com:vml" Requires="v">
-                <p:oleObj spid="_x0000_s32912" name="Equation" r:id="rId5" imgW="3314520" imgH="228600" progId="Equation.3">
+                <p:oleObj spid="_x0000_s32914" name="Equation" r:id="rId5" imgW="3314520" imgH="228600" progId="Equation.3">
                   <p:embed/>
                 </p:oleObj>
               </mc:Choice>
@@ -26428,7 +26413,7 @@
           <a:graphicData uri="http://schemas.openxmlformats.org/presentationml/2006/ole">
             <mc:AlternateContent xmlns:mc="http://schemas.openxmlformats.org/markup-compatibility/2006">
               <mc:Choice xmlns:v="urn:schemas-microsoft-com:vml" Requires="v">
-                <p:oleObj spid="_x0000_s17504" name="Equation" r:id="rId3" imgW="3149280" imgH="469800" progId="Equation.3">
+                <p:oleObj spid="_x0000_s17505" name="Equation" r:id="rId3" imgW="3149280" imgH="469800" progId="Equation.3">
                   <p:embed/>
                 </p:oleObj>
               </mc:Choice>
@@ -26607,6 +26592,212 @@
             <a:spLocks noGrp="1"/>
           </p:cNvSpPr>
           <p:nvPr>
+            <p:ph type="title"/>
+          </p:nvPr>
+        </p:nvSpPr>
+        <p:spPr/>
+        <p:txBody>
+          <a:bodyPr/>
+          <a:lstStyle/>
+          <a:p>
+            <a:r>
+              <a:rPr lang="en-US" smtClean="0"/>
+              <a:t>Module 4 </a:t>
+            </a:r>
+            <a:r>
+              <a:rPr lang="en-US" dirty="0" smtClean="0"/>
+              <a:t>Concluding Comments</a:t>
+            </a:r>
+            <a:endParaRPr lang="en-US" dirty="0"/>
+          </a:p>
+        </p:txBody>
+      </p:sp>
+      <p:sp>
+        <p:nvSpPr>
+          <p:cNvPr id="3" name="Content Placeholder 2"/>
+          <p:cNvSpPr>
+            <a:spLocks noGrp="1"/>
+          </p:cNvSpPr>
+          <p:nvPr>
+            <p:ph idx="1"/>
+          </p:nvPr>
+        </p:nvSpPr>
+        <p:spPr/>
+        <p:txBody>
+          <a:bodyPr>
+            <a:normAutofit fontScale="77500" lnSpcReduction="20000"/>
+          </a:bodyPr>
+          <a:lstStyle/>
+          <a:p>
+            <a:r>
+              <a:rPr lang="en-US" dirty="0"/>
+              <a:t>Traditionally, voltage control has been achieved thorough the operation of devices operating only on local information.</a:t>
+            </a:r>
+          </a:p>
+          <a:p>
+            <a:pPr lvl="1"/>
+            <a:r>
+              <a:rPr lang="en-US" dirty="0"/>
+              <a:t>Transmission: Voltage regulators at central generators and shunt capacitors</a:t>
+            </a:r>
+          </a:p>
+          <a:p>
+            <a:pPr lvl="1"/>
+            <a:r>
+              <a:rPr lang="en-US" dirty="0"/>
+              <a:t>Distribution: Voltage regulators and shunt capacitors</a:t>
+            </a:r>
+          </a:p>
+          <a:p>
+            <a:endParaRPr lang="en-US" dirty="0"/>
+          </a:p>
+          <a:p>
+            <a:r>
+              <a:rPr lang="en-US" dirty="0"/>
+              <a:t>Voltage control is essential to ensure the proper operation of the end-use loads.</a:t>
+            </a:r>
+          </a:p>
+          <a:p>
+            <a:endParaRPr lang="en-US" dirty="0"/>
+          </a:p>
+          <a:p>
+            <a:r>
+              <a:rPr lang="en-US" dirty="0"/>
+              <a:t>Additionally, the energy consumption of end-use loads is a function of the supply voltage.</a:t>
+            </a:r>
+          </a:p>
+          <a:p>
+            <a:endParaRPr lang="en-US" dirty="0"/>
+          </a:p>
+          <a:p>
+            <a:r>
+              <a:rPr lang="en-US" dirty="0"/>
+              <a:t>The voltage dependent nature of end-use loads can be modeled with a number of representations:</a:t>
+            </a:r>
+          </a:p>
+          <a:p>
+            <a:pPr lvl="1"/>
+            <a:r>
+              <a:rPr lang="en-US" dirty="0"/>
+              <a:t>Time-invariant ZIP model</a:t>
+            </a:r>
+          </a:p>
+          <a:p>
+            <a:pPr lvl="1"/>
+            <a:r>
+              <a:rPr lang="en-US" dirty="0"/>
+              <a:t>Time-variant ZIP model</a:t>
+            </a:r>
+          </a:p>
+          <a:p>
+            <a:pPr lvl="1"/>
+            <a:r>
+              <a:rPr lang="en-US" dirty="0"/>
+              <a:t>Physical model</a:t>
+            </a:r>
+          </a:p>
+          <a:p>
+            <a:pPr lvl="1"/>
+            <a:r>
+              <a:rPr lang="en-US" dirty="0"/>
+              <a:t>Multi-state physical model</a:t>
+            </a:r>
+          </a:p>
+          <a:p>
+            <a:pPr lvl="1"/>
+            <a:r>
+              <a:rPr lang="en-US" dirty="0"/>
+              <a:t>Load </a:t>
+            </a:r>
+            <a:r>
+              <a:rPr lang="en-US" dirty="0" smtClean="0"/>
+              <a:t>profile</a:t>
+            </a:r>
+            <a:endParaRPr lang="en-US" dirty="0"/>
+          </a:p>
+        </p:txBody>
+      </p:sp>
+      <p:sp>
+        <p:nvSpPr>
+          <p:cNvPr id="4" name="Slide Number Placeholder 3"/>
+          <p:cNvSpPr>
+            <a:spLocks noGrp="1"/>
+          </p:cNvSpPr>
+          <p:nvPr>
+            <p:ph type="sldNum" sz="quarter" idx="12"/>
+          </p:nvPr>
+        </p:nvSpPr>
+        <p:spPr/>
+        <p:txBody>
+          <a:bodyPr/>
+          <a:lstStyle/>
+          <a:p>
+            <a:pPr>
+              <a:defRPr/>
+            </a:pPr>
+            <a:fld id="{1B01BA5B-7730-4338-A929-CCF4E62AD04F}" type="slidenum">
+              <a:rPr lang="en-US" smtClean="0"/>
+              <a:pPr>
+                <a:defRPr/>
+              </a:pPr>
+              <a:t>70</a:t>
+            </a:fld>
+            <a:endParaRPr lang="en-US"/>
+          </a:p>
+        </p:txBody>
+      </p:sp>
+    </p:spTree>
+    <p:extLst>
+      <p:ext uri="{BB962C8B-B14F-4D97-AF65-F5344CB8AC3E}">
+        <p14:creationId xmlns:p14="http://schemas.microsoft.com/office/powerpoint/2010/main" val="2518113767"/>
+      </p:ext>
+    </p:extLst>
+  </p:cSld>
+  <p:clrMapOvr>
+    <a:masterClrMapping/>
+  </p:clrMapOvr>
+  <mc:AlternateContent xmlns:mc="http://schemas.openxmlformats.org/markup-compatibility/2006" xmlns:p14="http://schemas.microsoft.com/office/powerpoint/2010/main">
+    <mc:Choice Requires="p14">
+      <p:transition spd="slow" p14:dur="2000"/>
+    </mc:Choice>
+    <mc:Fallback xmlns="">
+      <p:transition spd="slow"/>
+    </mc:Fallback>
+  </mc:AlternateContent>
+  <p:timing>
+    <p:tnLst>
+      <p:par>
+        <p:cTn id="1" dur="indefinite" restart="never" nodeType="tmRoot"/>
+      </p:par>
+    </p:tnLst>
+  </p:timing>
+</p:sld>
+</file>
+
+<file path=ppt/slides/slide71.xml><?xml version="1.0" encoding="utf-8"?>
+<p:sld xmlns:a="http://schemas.openxmlformats.org/drawingml/2006/main" xmlns:r="http://schemas.openxmlformats.org/officeDocument/2006/relationships" xmlns:p="http://schemas.openxmlformats.org/presentationml/2006/main">
+  <p:cSld>
+    <p:spTree>
+      <p:nvGrpSpPr>
+        <p:cNvPr id="1" name=""/>
+        <p:cNvGrpSpPr/>
+        <p:nvPr/>
+      </p:nvGrpSpPr>
+      <p:grpSpPr>
+        <a:xfrm>
+          <a:off x="0" y="0"/>
+          <a:ext cx="0" cy="0"/>
+          <a:chOff x="0" y="0"/>
+          <a:chExt cx="0" cy="0"/>
+        </a:xfrm>
+      </p:grpSpPr>
+      <p:sp>
+        <p:nvSpPr>
+          <p:cNvPr id="2" name="Title 1"/>
+          <p:cNvSpPr>
+            <a:spLocks noGrp="1"/>
+          </p:cNvSpPr>
+          <p:nvPr>
             <p:ph type="ctrTitle"/>
           </p:nvPr>
         </p:nvSpPr>
@@ -26669,7 +26860,7 @@
             <a:fld id="{B6F15528-21DE-4FAA-801E-634DDDAF4B2B}" type="slidenum">
               <a:rPr lang="en-US" smtClean="0"/>
               <a:pPr/>
-              <a:t>70</a:t>
+              <a:t>71</a:t>
             </a:fld>
             <a:endParaRPr lang="en-US"/>
           </a:p>
@@ -26786,7 +26977,7 @@
           <a:graphicData uri="http://schemas.openxmlformats.org/presentationml/2006/ole">
             <mc:AlternateContent xmlns:mc="http://schemas.openxmlformats.org/markup-compatibility/2006">
               <mc:Choice xmlns:v="urn:schemas-microsoft-com:vml" Requires="v">
-                <p:oleObj spid="_x0000_s36894" name="Equation" r:id="rId3" imgW="3377880" imgH="469800" progId="Equation.3">
+                <p:oleObj spid="_x0000_s36896" name="Equation" r:id="rId3" imgW="3377880" imgH="469800" progId="Equation.3">
                   <p:embed/>
                 </p:oleObj>
               </mc:Choice>
@@ -26850,7 +27041,7 @@
           <a:graphicData uri="http://schemas.openxmlformats.org/presentationml/2006/ole">
             <mc:AlternateContent xmlns:mc="http://schemas.openxmlformats.org/markup-compatibility/2006">
               <mc:Choice xmlns:v="urn:schemas-microsoft-com:vml" Requires="v">
-                <p:oleObj spid="_x0000_s36895" name="Equation" r:id="rId5" imgW="3377880" imgH="469800" progId="Equation.3">
+                <p:oleObj spid="_x0000_s36897" name="Equation" r:id="rId5" imgW="3377880" imgH="469800" progId="Equation.3">
                   <p:embed/>
                 </p:oleObj>
               </mc:Choice>
@@ -27345,7 +27536,7 @@
           <a:graphicData uri="http://schemas.openxmlformats.org/presentationml/2006/ole">
             <mc:AlternateContent xmlns:mc="http://schemas.openxmlformats.org/markup-compatibility/2006">
               <mc:Choice xmlns:v="urn:schemas-microsoft-com:vml" Requires="v">
-                <p:oleObj spid="_x0000_s37919" name="Equation" r:id="rId3" imgW="3377880" imgH="469800" progId="Equation.3">
+                <p:oleObj spid="_x0000_s37921" name="Equation" r:id="rId3" imgW="3377880" imgH="469800" progId="Equation.3">
                   <p:embed/>
                 </p:oleObj>
               </mc:Choice>
@@ -27428,7 +27619,7 @@
           <a:graphicData uri="http://schemas.openxmlformats.org/presentationml/2006/ole">
             <mc:AlternateContent xmlns:mc="http://schemas.openxmlformats.org/markup-compatibility/2006">
               <mc:Choice xmlns:v="urn:schemas-microsoft-com:vml" Requires="v">
-                <p:oleObj spid="_x0000_s37920" name="Equation" r:id="rId5" imgW="3187440" imgH="469800" progId="Equation.3">
+                <p:oleObj spid="_x0000_s37922" name="Equation" r:id="rId5" imgW="3187440" imgH="469800" progId="Equation.3">
                   <p:embed/>
                 </p:oleObj>
               </mc:Choice>

</xml_diff>